<commit_message>
Pre-lecture minor slides update (adding homework 2)
git-svn-id: https://svn.code.sf.net/p/cpp-lects-rus/code/trunk@239 39143b06-f351-456c-9f92-4cd32fad6823
</commit_message>
<xml_diff>
--- a/slides/sep2017/07-variadics.pptx
+++ b/slides/sep2017/07-variadics.pptx
@@ -5,7 +5,7 @@
     <p:sldMasterId id="2147483684" r:id="rId1"/>
   </p:sldMasterIdLst>
   <p:notesMasterIdLst>
-    <p:notesMasterId r:id="rId62"/>
+    <p:notesMasterId r:id="rId66"/>
   </p:notesMasterIdLst>
   <p:sldIdLst>
     <p:sldId id="256" r:id="rId2"/>
@@ -68,6 +68,10 @@
     <p:sldId id="314" r:id="rId59"/>
     <p:sldId id="315" r:id="rId60"/>
     <p:sldId id="258" r:id="rId61"/>
+    <p:sldId id="316" r:id="rId62"/>
+    <p:sldId id="317" r:id="rId63"/>
+    <p:sldId id="318" r:id="rId64"/>
+    <p:sldId id="319" r:id="rId65"/>
   </p:sldIdLst>
   <p:sldSz cx="12192000" cy="6858000"/>
   <p:notesSz cx="6858000" cy="9144000"/>
@@ -256,7 +260,7 @@
           <a:p>
             <a:fld id="{B041AF36-CD26-47D2-B9B3-DA4139894D3A}" type="datetimeFigureOut">
               <a:rPr lang="en-US" smtClean="0"/>
-              <a:t>10/27/2017</a:t>
+              <a:t>11/21/2017</a:t>
             </a:fld>
             <a:endParaRPr lang="en-US"/>
           </a:p>
@@ -805,7 +809,7 @@
             <a:fld id="{96DFF08F-DC6B-4601-B491-B0F83F6DD2DA}" type="datetimeFigureOut">
               <a:rPr lang="en-US" dirty="0"/>
               <a:pPr/>
-              <a:t>10/27/2017</a:t>
+              <a:t>11/21/2017</a:t>
             </a:fld>
             <a:endParaRPr lang="en-US" dirty="0"/>
           </a:p>
@@ -1022,7 +1026,7 @@
           <a:p>
             <a:fld id="{96DFF08F-DC6B-4601-B491-B0F83F6DD2DA}" type="datetimeFigureOut">
               <a:rPr lang="en-US" dirty="0"/>
-              <a:t>10/27/2017</a:t>
+              <a:t>11/21/2017</a:t>
             </a:fld>
             <a:endParaRPr lang="en-US" dirty="0"/>
           </a:p>
@@ -1197,7 +1201,7 @@
           <a:p>
             <a:fld id="{96DFF08F-DC6B-4601-B491-B0F83F6DD2DA}" type="datetimeFigureOut">
               <a:rPr lang="en-US" dirty="0"/>
-              <a:t>10/27/2017</a:t>
+              <a:t>11/21/2017</a:t>
             </a:fld>
             <a:endParaRPr lang="en-US" dirty="0"/>
           </a:p>
@@ -1362,7 +1366,7 @@
           <a:p>
             <a:fld id="{96DFF08F-DC6B-4601-B491-B0F83F6DD2DA}" type="datetimeFigureOut">
               <a:rPr lang="en-US" dirty="0"/>
-              <a:t>10/27/2017</a:t>
+              <a:t>11/21/2017</a:t>
             </a:fld>
             <a:endParaRPr lang="en-US" dirty="0"/>
           </a:p>
@@ -1608,7 +1612,7 @@
           <a:p>
             <a:fld id="{96DFF08F-DC6B-4601-B491-B0F83F6DD2DA}" type="datetimeFigureOut">
               <a:rPr lang="en-US" dirty="0"/>
-              <a:t>10/27/2017</a:t>
+              <a:t>11/21/2017</a:t>
             </a:fld>
             <a:endParaRPr lang="en-US" dirty="0"/>
           </a:p>
@@ -1926,7 +1930,7 @@
           <a:p>
             <a:fld id="{96DFF08F-DC6B-4601-B491-B0F83F6DD2DA}" type="datetimeFigureOut">
               <a:rPr lang="en-US" dirty="0"/>
-              <a:t>10/27/2017</a:t>
+              <a:t>11/21/2017</a:t>
             </a:fld>
             <a:endParaRPr lang="en-US" dirty="0"/>
           </a:p>
@@ -2345,7 +2349,7 @@
           <a:p>
             <a:fld id="{96DFF08F-DC6B-4601-B491-B0F83F6DD2DA}" type="datetimeFigureOut">
               <a:rPr lang="en-US" dirty="0"/>
-              <a:t>10/27/2017</a:t>
+              <a:t>11/21/2017</a:t>
             </a:fld>
             <a:endParaRPr lang="en-US" dirty="0"/>
           </a:p>
@@ -2458,7 +2462,7 @@
           <a:p>
             <a:fld id="{96DFF08F-DC6B-4601-B491-B0F83F6DD2DA}" type="datetimeFigureOut">
               <a:rPr lang="en-US" dirty="0"/>
-              <a:t>10/27/2017</a:t>
+              <a:t>11/21/2017</a:t>
             </a:fld>
             <a:endParaRPr lang="en-US" dirty="0"/>
           </a:p>
@@ -2548,7 +2552,7 @@
           <a:p>
             <a:fld id="{96DFF08F-DC6B-4601-B491-B0F83F6DD2DA}" type="datetimeFigureOut">
               <a:rPr lang="en-US" dirty="0"/>
-              <a:t>10/27/2017</a:t>
+              <a:t>11/21/2017</a:t>
             </a:fld>
             <a:endParaRPr lang="en-US" dirty="0"/>
           </a:p>
@@ -2833,7 +2837,7 @@
           <a:p>
             <a:fld id="{96DFF08F-DC6B-4601-B491-B0F83F6DD2DA}" type="datetimeFigureOut">
               <a:rPr lang="en-US" dirty="0"/>
-              <a:t>10/27/2017</a:t>
+              <a:t>11/21/2017</a:t>
             </a:fld>
             <a:endParaRPr lang="en-US" dirty="0"/>
           </a:p>
@@ -3100,7 +3104,7 @@
           <a:p>
             <a:fld id="{96DFF08F-DC6B-4601-B491-B0F83F6DD2DA}" type="datetimeFigureOut">
               <a:rPr lang="en-US" dirty="0"/>
-              <a:t>10/27/2017</a:t>
+              <a:t>11/21/2017</a:t>
             </a:fld>
             <a:endParaRPr lang="en-US" dirty="0"/>
           </a:p>
@@ -3349,7 +3353,7 @@
             <a:fld id="{96DFF08F-DC6B-4601-B491-B0F83F6DD2DA}" type="datetimeFigureOut">
               <a:rPr lang="en-US" dirty="0"/>
               <a:pPr/>
-              <a:t>10/27/2017</a:t>
+              <a:t>11/21/2017</a:t>
             </a:fld>
             <a:endParaRPr lang="en-US" dirty="0"/>
           </a:p>
@@ -10044,7 +10048,28 @@
               <a:rPr lang="en-US" smtClean="0">
                 <a:latin typeface="Consolas" panose="020B0609020204030204" pitchFamily="49" charset="0"/>
               </a:rPr>
-              <a:t>string s; bool succ = parse_string&lt;int</a:t>
+              <a:t>int</a:t>
+            </a:r>
+            <a:r>
+              <a:rPr lang="en-US" smtClean="0">
+                <a:solidFill>
+                  <a:srgbClr val="0000FF"/>
+                </a:solidFill>
+                <a:latin typeface="Consolas" panose="020B0609020204030204" pitchFamily="49" charset="0"/>
+              </a:rPr>
+              <a:t> </a:t>
+            </a:r>
+            <a:r>
+              <a:rPr lang="en-US" smtClean="0">
+                <a:latin typeface="Consolas" panose="020B0609020204030204" pitchFamily="49" charset="0"/>
+              </a:rPr>
+              <a:t>s</a:t>
+            </a:r>
+            <a:r>
+              <a:rPr lang="en-US" smtClean="0">
+                <a:latin typeface="Consolas" panose="020B0609020204030204" pitchFamily="49" charset="0"/>
+              </a:rPr>
+              <a:t>; bool succ = parse_string&lt;int</a:t>
             </a:r>
             <a:r>
               <a:rPr lang="en-US">
@@ -10394,7 +10419,13 @@
               <a:rPr lang="en-US" smtClean="0">
                 <a:latin typeface="Consolas" panose="020B0609020204030204" pitchFamily="49" charset="0"/>
               </a:rPr>
-              <a:t>string s = parsed.second;</a:t>
+              <a:t>auto s </a:t>
+            </a:r>
+            <a:r>
+              <a:rPr lang="en-US" smtClean="0">
+                <a:latin typeface="Consolas" panose="020B0609020204030204" pitchFamily="49" charset="0"/>
+              </a:rPr>
+              <a:t>= parsed.second;</a:t>
             </a:r>
             <a:endParaRPr lang="en-US"/>
           </a:p>
@@ -10715,7 +10746,13 @@
               <a:rPr lang="en-US" smtClean="0">
                 <a:latin typeface="Consolas" panose="020B0609020204030204" pitchFamily="49" charset="0"/>
               </a:rPr>
-              <a:t>string s = </a:t>
+              <a:t>auto s </a:t>
+            </a:r>
+            <a:r>
+              <a:rPr lang="en-US" smtClean="0">
+                <a:latin typeface="Consolas" panose="020B0609020204030204" pitchFamily="49" charset="0"/>
+              </a:rPr>
+              <a:t>= </a:t>
             </a:r>
             <a:r>
               <a:rPr lang="en-US" smtClean="0">
@@ -13940,7 +13977,13 @@
               <a:rPr lang="en-US">
                 <a:latin typeface="Consolas" panose="020B0609020204030204" pitchFamily="49" charset="0"/>
               </a:rPr>
-              <a:t>auto v = make_from_tuple &lt;vector&lt;int&gt;&gt; (t);</a:t>
+              <a:t>auto v = make_from_tuple &lt;vector&lt;int&gt;&gt; </a:t>
+            </a:r>
+            <a:r>
+              <a:rPr lang="en-US" smtClean="0">
+                <a:latin typeface="Consolas" panose="020B0609020204030204" pitchFamily="49" charset="0"/>
+              </a:rPr>
+              <a:t>(make_tuple(10, 20));</a:t>
             </a:r>
             <a:endParaRPr lang="ru-RU" smtClean="0"/>
           </a:p>
@@ -15103,13 +15146,7 @@
               <a:rPr lang="en-US">
                 <a:latin typeface="Consolas" panose="020B0609020204030204" pitchFamily="49" charset="0"/>
               </a:rPr>
-              <a:t>template &lt;typename </a:t>
-            </a:r>
-            <a:r>
-              <a:rPr lang="en-US">
-                <a:latin typeface="Consolas" panose="020B0609020204030204" pitchFamily="49" charset="0"/>
-              </a:rPr>
-              <a:t>... </a:t>
+              <a:t>template &lt;typename ... </a:t>
             </a:r>
             <a:r>
               <a:rPr lang="en-US" smtClean="0">
@@ -15157,12 +15194,6 @@
                 <a:latin typeface="Consolas" panose="020B0609020204030204" pitchFamily="49" charset="0"/>
               </a:rPr>
               <a:t>(args + ...);</a:t>
-            </a:r>
-            <a:r>
-              <a:rPr lang="en-US">
-                <a:latin typeface="Consolas" panose="020B0609020204030204" pitchFamily="49" charset="0"/>
-              </a:rPr>
-              <a:t/>
             </a:r>
             <a:br>
               <a:rPr lang="en-US">
@@ -15257,12 +15288,6 @@
                 <a:latin typeface="Consolas" panose="020B0609020204030204" pitchFamily="49" charset="0"/>
               </a:rPr>
               <a:t> </a:t>
-            </a:r>
-            <a:r>
-              <a:rPr lang="ru-RU">
-                <a:latin typeface="Consolas" panose="020B0609020204030204" pitchFamily="49" charset="0"/>
-              </a:rPr>
-              <a:t/>
             </a:r>
             <a:br>
               <a:rPr lang="ru-RU">
@@ -15511,12 +15536,6 @@
               </a:rPr>
               <a:t> </a:t>
             </a:r>
-            <a:r>
-              <a:rPr lang="ru-RU">
-                <a:latin typeface="Consolas" panose="020B0609020204030204" pitchFamily="49" charset="0"/>
-              </a:rPr>
-              <a:t/>
-            </a:r>
             <a:br>
               <a:rPr lang="ru-RU">
                 <a:latin typeface="Consolas" panose="020B0609020204030204" pitchFamily="49" charset="0"/>
@@ -15619,13 +15638,7 @@
               <a:rPr lang="en-US">
                 <a:latin typeface="Consolas" panose="020B0609020204030204" pitchFamily="49" charset="0"/>
               </a:rPr>
-              <a:t>int t = add (1, 1.0, 1u</a:t>
-            </a:r>
-            <a:r>
-              <a:rPr lang="en-US">
-                <a:latin typeface="Consolas" panose="020B0609020204030204" pitchFamily="49" charset="0"/>
-              </a:rPr>
-              <a:t>); </a:t>
+              <a:t>int t = add (1, 1.0, 1u); </a:t>
             </a:r>
             <a:r>
               <a:rPr lang="en-US" smtClean="0">
@@ -15692,13 +15705,7 @@
               <a:rPr lang="en-US">
                 <a:latin typeface="Consolas" panose="020B0609020204030204" pitchFamily="49" charset="0"/>
               </a:rPr>
-              <a:t>add &lt;</a:t>
-            </a:r>
-            <a:r>
-              <a:rPr lang="en-US">
-                <a:latin typeface="Consolas" panose="020B0609020204030204" pitchFamily="49" charset="0"/>
-              </a:rPr>
-              <a:t>unsigned</a:t>
+              <a:t>add &lt;unsigned</a:t>
             </a:r>
             <a:r>
               <a:rPr lang="en-US" smtClean="0">
@@ -15749,7 +15756,11 @@
           <a:p>
             <a:r>
               <a:rPr lang="ru-RU" smtClean="0"/>
-              <a:t>Несмотря на некоторую громоздкость, это очень полезная техника</a:t>
+              <a:t>Тизер: эта идея получит развитие в лекции про </a:t>
+            </a:r>
+            <a:r>
+              <a:rPr lang="en-US" smtClean="0"/>
+              <a:t>SFINAE</a:t>
             </a:r>
             <a:endParaRPr lang="en-US"/>
           </a:p>
@@ -15900,13 +15911,7 @@
               <a:rPr lang="en-US">
                 <a:latin typeface="Consolas" panose="020B0609020204030204" pitchFamily="49" charset="0"/>
               </a:rPr>
-              <a:t>return v + u</a:t>
-            </a:r>
-            <a:r>
-              <a:rPr lang="en-US">
-                <a:latin typeface="Consolas" panose="020B0609020204030204" pitchFamily="49" charset="0"/>
-              </a:rPr>
-              <a:t>; </a:t>
+              <a:t>return v + u; </a:t>
             </a:r>
             <a:r>
               <a:rPr lang="en-US" smtClean="0">
@@ -15945,12 +15950,6 @@
                 <a:latin typeface="Consolas" panose="020B0609020204030204" pitchFamily="49" charset="0"/>
               </a:rPr>
               <a:t> </a:t>
-            </a:r>
-            <a:r>
-              <a:rPr lang="ru-RU">
-                <a:latin typeface="Consolas" panose="020B0609020204030204" pitchFamily="49" charset="0"/>
-              </a:rPr>
-              <a:t/>
             </a:r>
             <a:br>
               <a:rPr lang="ru-RU">
@@ -16160,13 +16159,7 @@
               <a:rPr lang="en-US">
                 <a:latin typeface="Consolas" panose="020B0609020204030204" pitchFamily="49" charset="0"/>
               </a:rPr>
-              <a:t>template&lt;typename T</a:t>
-            </a:r>
-            <a:r>
-              <a:rPr lang="en-US">
-                <a:latin typeface="Consolas" panose="020B0609020204030204" pitchFamily="49" charset="0"/>
-              </a:rPr>
-              <a:t>, </a:t>
+              <a:t>template&lt;typename T, </a:t>
             </a:r>
             <a:r>
               <a:rPr lang="ru-RU" smtClean="0">
@@ -16195,13 +16188,7 @@
               <a:rPr lang="en-US">
                 <a:latin typeface="Consolas" panose="020B0609020204030204" pitchFamily="49" charset="0"/>
               </a:rPr>
-              <a:t>... Args</a:t>
-            </a:r>
-            <a:r>
-              <a:rPr lang="en-US">
-                <a:latin typeface="Consolas" panose="020B0609020204030204" pitchFamily="49" charset="0"/>
-              </a:rPr>
-              <a:t>&gt; </a:t>
+              <a:t>... Args&gt; </a:t>
             </a:r>
             <a:r>
               <a:rPr lang="ru-RU" smtClean="0">
@@ -16253,13 +16240,7 @@
               <a:rPr lang="en-US">
                 <a:latin typeface="Consolas" panose="020B0609020204030204" pitchFamily="49" charset="0"/>
               </a:rPr>
-              <a:t>char* s</a:t>
-            </a:r>
-            <a:r>
-              <a:rPr lang="en-US">
-                <a:latin typeface="Consolas" panose="020B0609020204030204" pitchFamily="49" charset="0"/>
-              </a:rPr>
-              <a:t>, </a:t>
+              <a:t>char* s, </a:t>
             </a:r>
             <a:r>
               <a:rPr lang="ru-RU" smtClean="0">
@@ -16300,13 +16281,7 @@
               <a:rPr lang="en-US">
                 <a:latin typeface="Consolas" panose="020B0609020204030204" pitchFamily="49" charset="0"/>
               </a:rPr>
-              <a:t>&amp;&amp; value</a:t>
-            </a:r>
-            <a:r>
-              <a:rPr lang="en-US">
-                <a:latin typeface="Consolas" panose="020B0609020204030204" pitchFamily="49" charset="0"/>
-              </a:rPr>
-              <a:t>, </a:t>
+              <a:t>&amp;&amp; value, </a:t>
             </a:r>
             <a:r>
               <a:rPr lang="ru-RU" smtClean="0">
@@ -16370,13 +16345,7 @@
               <a:rPr lang="en-US">
                 <a:latin typeface="Consolas" panose="020B0609020204030204" pitchFamily="49" charset="0"/>
               </a:rPr>
-              <a:t>int ts_printf(const char</a:t>
-            </a:r>
-            <a:r>
-              <a:rPr lang="en-US">
-                <a:latin typeface="Consolas" panose="020B0609020204030204" pitchFamily="49" charset="0"/>
-              </a:rPr>
-              <a:t>* </a:t>
+              <a:t>int ts_printf(const char* </a:t>
             </a:r>
             <a:r>
               <a:rPr lang="en-US" smtClean="0">
@@ -16482,13 +16451,7 @@
               <a:rPr lang="en-US">
                 <a:latin typeface="Consolas" panose="020B0609020204030204" pitchFamily="49" charset="0"/>
               </a:rPr>
-              <a:t>int ts_printf(const char* s</a:t>
-            </a:r>
-            <a:r>
-              <a:rPr lang="en-US">
-                <a:latin typeface="Consolas" panose="020B0609020204030204" pitchFamily="49" charset="0"/>
-              </a:rPr>
-              <a:t>) </a:t>
+              <a:t>int ts_printf(const char* s) </a:t>
             </a:r>
             <a:r>
               <a:rPr lang="en-US" smtClean="0">
@@ -16528,13 +16491,7 @@
               <a:rPr lang="en-US">
                 <a:latin typeface="Consolas" panose="020B0609020204030204" pitchFamily="49" charset="0"/>
               </a:rPr>
-              <a:t>while (*s</a:t>
-            </a:r>
-            <a:r>
-              <a:rPr lang="en-US">
-                <a:latin typeface="Consolas" panose="020B0609020204030204" pitchFamily="49" charset="0"/>
-              </a:rPr>
-              <a:t>) </a:t>
+              <a:t>while (*s) </a:t>
             </a:r>
             <a:r>
               <a:rPr lang="en-US" smtClean="0">
@@ -16563,13 +16520,7 @@
               <a:rPr lang="en-US">
                 <a:latin typeface="Consolas" panose="020B0609020204030204" pitchFamily="49" charset="0"/>
               </a:rPr>
-              <a:t>if (*s == '%' &amp;&amp; *++s </a:t>
-            </a:r>
-            <a:r>
-              <a:rPr lang="en-US">
-                <a:latin typeface="Consolas" panose="020B0609020204030204" pitchFamily="49" charset="0"/>
-              </a:rPr>
-              <a:t>!= </a:t>
+              <a:t>if (*s == '%' &amp;&amp; *++s != </a:t>
             </a:r>
             <a:r>
               <a:rPr lang="en-US" smtClean="0">
@@ -16610,13 +16561,7 @@
               <a:rPr lang="en-US">
                 <a:latin typeface="Consolas" panose="020B0609020204030204" pitchFamily="49" charset="0"/>
               </a:rPr>
-              <a:t>string: missing </a:t>
-            </a:r>
-            <a:r>
-              <a:rPr lang="en-US">
-                <a:latin typeface="Consolas" panose="020B0609020204030204" pitchFamily="49" charset="0"/>
-              </a:rPr>
-              <a:t>arguments</a:t>
+              <a:t>string: missing arguments</a:t>
             </a:r>
             <a:r>
               <a:rPr lang="en-US" smtClean="0">
@@ -16656,13 +16601,7 @@
               <a:rPr lang="en-US">
                 <a:latin typeface="Consolas" panose="020B0609020204030204" pitchFamily="49" charset="0"/>
               </a:rPr>
-              <a:t>&lt;&lt; *</a:t>
-            </a:r>
-            <a:r>
-              <a:rPr lang="en-US">
-                <a:latin typeface="Consolas" panose="020B0609020204030204" pitchFamily="49" charset="0"/>
-              </a:rPr>
-              <a:t>s</a:t>
+              <a:t>&lt;&lt; *s</a:t>
             </a:r>
             <a:r>
               <a:rPr lang="en-US" smtClean="0">
@@ -16814,19 +16753,7 @@
               <a:rPr lang="en-US">
                 <a:latin typeface="Consolas" panose="020B0609020204030204" pitchFamily="49" charset="0"/>
               </a:rPr>
-              <a:t>template&lt;typename T, typename... Args</a:t>
-            </a:r>
-            <a:r>
-              <a:rPr lang="en-US">
-                <a:latin typeface="Consolas" panose="020B0609020204030204" pitchFamily="49" charset="0"/>
-              </a:rPr>
-              <a:t>&gt; </a:t>
-            </a:r>
-            <a:r>
-              <a:rPr lang="en-US">
-                <a:latin typeface="Consolas" panose="020B0609020204030204" pitchFamily="49" charset="0"/>
-              </a:rPr>
-              <a:t/>
+              <a:t>template&lt;typename T, typename... Args&gt; </a:t>
             </a:r>
             <a:br>
               <a:rPr lang="en-US">
@@ -16843,13 +16770,7 @@
               <a:rPr lang="en-US">
                 <a:latin typeface="Consolas" panose="020B0609020204030204" pitchFamily="49" charset="0"/>
               </a:rPr>
-              <a:t>ts_printf(const char* s, T&amp;&amp; value, Args&amp;&amp;... args</a:t>
-            </a:r>
-            <a:r>
-              <a:rPr lang="en-US">
-                <a:latin typeface="Consolas" panose="020B0609020204030204" pitchFamily="49" charset="0"/>
-              </a:rPr>
-              <a:t>) </a:t>
+              <a:t>ts_printf(const char* s, T&amp;&amp; value, Args&amp;&amp;... args) </a:t>
             </a:r>
             <a:r>
               <a:rPr lang="en-US" smtClean="0">
@@ -16872,13 +16793,7 @@
               <a:rPr lang="en-US">
                 <a:latin typeface="Consolas" panose="020B0609020204030204" pitchFamily="49" charset="0"/>
               </a:rPr>
-              <a:t>while (*s</a:t>
-            </a:r>
-            <a:r>
-              <a:rPr lang="en-US">
-                <a:latin typeface="Consolas" panose="020B0609020204030204" pitchFamily="49" charset="0"/>
-              </a:rPr>
-              <a:t>) </a:t>
+              <a:t>while (*s) </a:t>
             </a:r>
             <a:r>
               <a:rPr lang="en-US" smtClean="0">
@@ -16901,13 +16816,7 @@
               <a:rPr lang="en-US">
                 <a:latin typeface="Consolas" panose="020B0609020204030204" pitchFamily="49" charset="0"/>
               </a:rPr>
-              <a:t>if (*s == '%' &amp;&amp; *++s != </a:t>
-            </a:r>
-            <a:r>
-              <a:rPr lang="en-US">
-                <a:latin typeface="Consolas" panose="020B0609020204030204" pitchFamily="49" charset="0"/>
-              </a:rPr>
-              <a:t>'%') </a:t>
+              <a:t>if (*s == '%' &amp;&amp; *++s != '%') </a:t>
             </a:r>
             <a:r>
               <a:rPr lang="en-US" smtClean="0">
@@ -16930,13 +16839,7 @@
               <a:rPr lang="en-US">
                 <a:latin typeface="Consolas" panose="020B0609020204030204" pitchFamily="49" charset="0"/>
               </a:rPr>
-              <a:t>/* ignore the character that follows the </a:t>
-            </a:r>
-            <a:r>
-              <a:rPr lang="en-US">
-                <a:latin typeface="Consolas" panose="020B0609020204030204" pitchFamily="49" charset="0"/>
-              </a:rPr>
-              <a:t>'%'! </a:t>
+              <a:t>/* ignore the character that follows the '%'! </a:t>
             </a:r>
             <a:r>
               <a:rPr lang="en-US" smtClean="0">
@@ -16959,13 +16862,7 @@
               <a:rPr lang="en-US">
                 <a:latin typeface="Consolas" panose="020B0609020204030204" pitchFamily="49" charset="0"/>
               </a:rPr>
-              <a:t>&lt;&lt; </a:t>
-            </a:r>
-            <a:r>
-              <a:rPr lang="en-US">
-                <a:latin typeface="Consolas" panose="020B0609020204030204" pitchFamily="49" charset="0"/>
-              </a:rPr>
-              <a:t>value</a:t>
+              <a:t>&lt;&lt; value</a:t>
             </a:r>
             <a:r>
               <a:rPr lang="en-US" smtClean="0">
@@ -16988,13 +16885,7 @@
               <a:rPr lang="en-US">
                 <a:latin typeface="Consolas" panose="020B0609020204030204" pitchFamily="49" charset="0"/>
               </a:rPr>
-              <a:t>return printf(++s, forward&lt;Args&gt;(args)...) + </a:t>
-            </a:r>
-            <a:r>
-              <a:rPr lang="en-US">
-                <a:latin typeface="Consolas" panose="020B0609020204030204" pitchFamily="49" charset="0"/>
-              </a:rPr>
-              <a:t>1</a:t>
+              <a:t>return printf(++s, forward&lt;Args&gt;(args)...) + 1</a:t>
             </a:r>
             <a:r>
               <a:rPr lang="en-US" smtClean="0">
@@ -17028,13 +16919,7 @@
               <a:rPr lang="en-US">
                 <a:latin typeface="Consolas" panose="020B0609020204030204" pitchFamily="49" charset="0"/>
               </a:rPr>
-              <a:t>cout &lt;&lt; *</a:t>
-            </a:r>
-            <a:r>
-              <a:rPr lang="en-US">
-                <a:latin typeface="Consolas" panose="020B0609020204030204" pitchFamily="49" charset="0"/>
-              </a:rPr>
-              <a:t>s</a:t>
+              <a:t>cout &lt;&lt; *s</a:t>
             </a:r>
             <a:r>
               <a:rPr lang="en-US" smtClean="0">
@@ -17080,13 +16965,7 @@
               <a:rPr lang="en-US">
                 <a:latin typeface="Consolas" panose="020B0609020204030204" pitchFamily="49" charset="0"/>
               </a:rPr>
-              <a:t>("extra </a:t>
-            </a:r>
-            <a:r>
-              <a:rPr lang="en-US">
-                <a:latin typeface="Consolas" panose="020B0609020204030204" pitchFamily="49" charset="0"/>
-              </a:rPr>
-              <a:t>arguments </a:t>
+              <a:t>("extra arguments </a:t>
             </a:r>
             <a:r>
               <a:rPr lang="en-US" smtClean="0">
@@ -17207,11 +17086,7 @@
             </a:r>
             <a:r>
               <a:rPr lang="ru-RU"/>
-              <a:t>по </a:t>
-            </a:r>
-            <a:r>
-              <a:rPr lang="ru-RU"/>
-              <a:t>сравнению </a:t>
+              <a:t>по сравнению </a:t>
             </a:r>
             <a:r>
               <a:rPr lang="ru-RU" smtClean="0"/>
@@ -17341,13 +17216,7 @@
               <a:rPr lang="en-US">
                 <a:latin typeface="Consolas" panose="020B0609020204030204" pitchFamily="49" charset="0"/>
               </a:rPr>
-              <a:t>printf("%*s", 5, "</a:t>
-            </a:r>
-            <a:r>
-              <a:rPr lang="en-US">
-                <a:latin typeface="Consolas" panose="020B0609020204030204" pitchFamily="49" charset="0"/>
-              </a:rPr>
-              <a:t>Hi</a:t>
+              <a:t>printf("%*s", 5, "Hi</a:t>
             </a:r>
             <a:r>
               <a:rPr lang="en-US" smtClean="0">
@@ -17368,11 +17237,7 @@
             </a:r>
             <a:r>
               <a:rPr lang="ru-RU"/>
-              <a:t>по </a:t>
-            </a:r>
-            <a:r>
-              <a:rPr lang="ru-RU"/>
-              <a:t>сравнению </a:t>
+              <a:t>по сравнению </a:t>
             </a:r>
             <a:r>
               <a:rPr lang="ru-RU" smtClean="0"/>
@@ -17714,9 +17579,8 @@
             </a:r>
             <a:r>
               <a:rPr lang="en-US" smtClean="0"/>
-              <a:t>Edition</a:t>
-            </a:r>
-            <a:endParaRPr lang="ru-RU" smtClean="0"/>
+              <a:t>Edition, 2017</a:t>
+            </a:r>
           </a:p>
           <a:p>
             <a:pPr marL="502920" lvl="0" indent="-457200">
@@ -17725,7 +17589,40 @@
             </a:pPr>
             <a:r>
               <a:rPr lang="en-US"/>
-              <a:t>Simon Brand, "Adding C++17 structured bindings support to your classes", https://blog.tartanllama.xyz/structured-bindings/</a:t>
+              <a:t>A. Alexandrescu, Variadic templates and Funadic, GoingNative' 2012</a:t>
+            </a:r>
+          </a:p>
+          <a:p>
+            <a:pPr marL="502920" lvl="0" indent="-457200">
+              <a:buFont typeface="+mj-lt"/>
+              <a:buAutoNum type="arabicPeriod"/>
+            </a:pPr>
+            <a:r>
+              <a:rPr lang="en-US"/>
+              <a:t>S. T. Lavavej, Tuple: what's new and how it works, CppCon</a:t>
+            </a:r>
+            <a:r>
+              <a:rPr lang="en-US"/>
+              <a:t>' </a:t>
+            </a:r>
+            <a:r>
+              <a:rPr lang="en-US" smtClean="0"/>
+              <a:t>2016</a:t>
+            </a:r>
+            <a:endParaRPr lang="ru-RU" smtClean="0"/>
+          </a:p>
+          <a:p>
+            <a:pPr marL="502920" lvl="0" indent="-457200">
+              <a:buFont typeface="+mj-lt"/>
+              <a:buAutoNum type="arabicPeriod"/>
+            </a:pPr>
+            <a:r>
+              <a:rPr lang="en-US" smtClean="0"/>
+              <a:t>Simon </a:t>
+            </a:r>
+            <a:r>
+              <a:rPr lang="en-US"/>
+              <a:t>Brand, "Adding C++17 structured bindings support to your classes", https://blog.tartanllama.xyz/structured-bindings/</a:t>
             </a:r>
             <a:endParaRPr lang="en-US" dirty="0"/>
           </a:p>
@@ -17735,6 +17632,2226 @@
     <p:extLst>
       <p:ext uri="{BB962C8B-B14F-4D97-AF65-F5344CB8AC3E}">
         <p14:creationId xmlns:p14="http://schemas.microsoft.com/office/powerpoint/2010/main" val="1719869055"/>
+      </p:ext>
+    </p:extLst>
+  </p:cSld>
+  <p:clrMapOvr>
+    <a:masterClrMapping/>
+  </p:clrMapOvr>
+</p:sld>
+</file>
+
+<file path=ppt/slides/slide61.xml><?xml version="1.0" encoding="utf-8"?>
+<p:sld xmlns:a="http://schemas.openxmlformats.org/drawingml/2006/main" xmlns:r="http://schemas.openxmlformats.org/officeDocument/2006/relationships" xmlns:p="http://schemas.openxmlformats.org/presentationml/2006/main">
+  <p:cSld>
+    <p:spTree>
+      <p:nvGrpSpPr>
+        <p:cNvPr id="1" name=""/>
+        <p:cNvGrpSpPr/>
+        <p:nvPr/>
+      </p:nvGrpSpPr>
+      <p:grpSpPr>
+        <a:xfrm>
+          <a:off x="0" y="0"/>
+          <a:ext cx="0" cy="0"/>
+          <a:chOff x="0" y="0"/>
+          <a:chExt cx="0" cy="0"/>
+        </a:xfrm>
+      </p:grpSpPr>
+      <p:sp>
+        <p:nvSpPr>
+          <p:cNvPr id="5" name="Title 4"/>
+          <p:cNvSpPr>
+            <a:spLocks noGrp="1"/>
+          </p:cNvSpPr>
+          <p:nvPr>
+            <p:ph type="title"/>
+          </p:nvPr>
+        </p:nvSpPr>
+        <p:spPr>
+          <a:xfrm>
+            <a:off x="1106424" y="1173575"/>
+            <a:ext cx="10232136" cy="2926080"/>
+          </a:xfrm>
+        </p:spPr>
+        <p:txBody>
+          <a:bodyPr/>
+          <a:lstStyle/>
+          <a:p>
+            <a:r>
+              <a:rPr lang="ru-RU" smtClean="0"/>
+              <a:t>разработка </a:t>
+            </a:r>
+            <a:r>
+              <a:rPr lang="ru-RU" smtClean="0"/>
+              <a:t>дерева</a:t>
+            </a:r>
+            <a:endParaRPr lang="en-US"/>
+          </a:p>
+        </p:txBody>
+      </p:sp>
+      <p:sp>
+        <p:nvSpPr>
+          <p:cNvPr id="6" name="Text Placeholder 5"/>
+          <p:cNvSpPr>
+            <a:spLocks noGrp="1"/>
+          </p:cNvSpPr>
+          <p:nvPr>
+            <p:ph type="body" idx="1"/>
+          </p:nvPr>
+        </p:nvSpPr>
+        <p:spPr/>
+        <p:txBody>
+          <a:bodyPr/>
+          <a:lstStyle/>
+          <a:p>
+            <a:r>
+              <a:rPr lang="ru-RU" smtClean="0"/>
+              <a:t>Домашнее задание на разработку </a:t>
+            </a:r>
+            <a:r>
+              <a:rPr lang="ru-RU" smtClean="0"/>
+              <a:t>класса многосортного дерева</a:t>
+            </a:r>
+            <a:endParaRPr lang="en-US"/>
+          </a:p>
+        </p:txBody>
+      </p:sp>
+      <p:sp>
+        <p:nvSpPr>
+          <p:cNvPr id="4" name="Slide Number Placeholder 3"/>
+          <p:cNvSpPr>
+            <a:spLocks noGrp="1"/>
+          </p:cNvSpPr>
+          <p:nvPr>
+            <p:ph type="sldNum" sz="quarter" idx="12"/>
+          </p:nvPr>
+        </p:nvSpPr>
+        <p:spPr/>
+        <p:txBody>
+          <a:bodyPr/>
+          <a:lstStyle/>
+          <a:p>
+            <a:fld id="{4FAB73BC-B049-4115-A692-8D63A059BFB8}" type="slidenum">
+              <a:rPr lang="en-US" smtClean="0"/>
+              <a:t>61</a:t>
+            </a:fld>
+            <a:endParaRPr lang="en-US" dirty="0"/>
+          </a:p>
+        </p:txBody>
+      </p:sp>
+    </p:spTree>
+    <p:extLst>
+      <p:ext uri="{BB962C8B-B14F-4D97-AF65-F5344CB8AC3E}">
+        <p14:creationId xmlns:p14="http://schemas.microsoft.com/office/powerpoint/2010/main" val="3430106606"/>
+      </p:ext>
+    </p:extLst>
+  </p:cSld>
+  <p:clrMapOvr>
+    <a:masterClrMapping/>
+  </p:clrMapOvr>
+  <p:timing>
+    <p:tnLst>
+      <p:par>
+        <p:cTn id="1" dur="indefinite" restart="never" nodeType="tmRoot"/>
+      </p:par>
+    </p:tnLst>
+  </p:timing>
+</p:sld>
+</file>
+
+<file path=ppt/slides/slide62.xml><?xml version="1.0" encoding="utf-8"?>
+<p:sld xmlns:a="http://schemas.openxmlformats.org/drawingml/2006/main" xmlns:r="http://schemas.openxmlformats.org/officeDocument/2006/relationships" xmlns:p="http://schemas.openxmlformats.org/presentationml/2006/main">
+  <p:cSld>
+    <p:spTree>
+      <p:nvGrpSpPr>
+        <p:cNvPr id="1" name=""/>
+        <p:cNvGrpSpPr/>
+        <p:nvPr/>
+      </p:nvGrpSpPr>
+      <p:grpSpPr>
+        <a:xfrm>
+          <a:off x="0" y="0"/>
+          <a:ext cx="0" cy="0"/>
+          <a:chOff x="0" y="0"/>
+          <a:chExt cx="0" cy="0"/>
+        </a:xfrm>
+      </p:grpSpPr>
+      <p:sp>
+        <p:nvSpPr>
+          <p:cNvPr id="6" name="Title 5"/>
+          <p:cNvSpPr>
+            <a:spLocks noGrp="1"/>
+          </p:cNvSpPr>
+          <p:nvPr>
+            <p:ph type="title"/>
+          </p:nvPr>
+        </p:nvSpPr>
+        <p:spPr/>
+        <p:txBody>
+          <a:bodyPr/>
+          <a:lstStyle/>
+          <a:p>
+            <a:r>
+              <a:rPr lang="en-US" smtClean="0"/>
+              <a:t>PA</a:t>
+            </a:r>
+            <a:r>
+              <a:rPr lang="ru-RU" smtClean="0"/>
+              <a:t>2</a:t>
+            </a:r>
+            <a:r>
+              <a:rPr lang="en-US" smtClean="0"/>
+              <a:t> </a:t>
+            </a:r>
+            <a:r>
+              <a:rPr lang="en-US"/>
+              <a:t>:: </a:t>
+            </a:r>
+            <a:r>
+              <a:rPr lang="ru-RU"/>
+              <a:t>Разработка </a:t>
+            </a:r>
+            <a:r>
+              <a:rPr lang="ru-RU" smtClean="0"/>
+              <a:t>дерева</a:t>
+            </a:r>
+            <a:endParaRPr lang="en-US"/>
+          </a:p>
+        </p:txBody>
+      </p:sp>
+      <p:sp>
+        <p:nvSpPr>
+          <p:cNvPr id="7" name="Content Placeholder 6"/>
+          <p:cNvSpPr>
+            <a:spLocks noGrp="1"/>
+          </p:cNvSpPr>
+          <p:nvPr>
+            <p:ph idx="1"/>
+          </p:nvPr>
+        </p:nvSpPr>
+        <p:spPr/>
+        <p:txBody>
+          <a:bodyPr/>
+          <a:lstStyle/>
+          <a:p>
+            <a:r>
+              <a:rPr lang="ru-RU" smtClean="0"/>
+              <a:t>Задание: разработать вариабельно-шаблонный класс многосортного дерева</a:t>
+            </a:r>
+          </a:p>
+          <a:p>
+            <a:pPr marL="45720" indent="0">
+              <a:buNone/>
+            </a:pPr>
+            <a:r>
+              <a:rPr lang="en-US">
+                <a:latin typeface="Consolas" panose="020B0609020204030204" pitchFamily="49" charset="0"/>
+              </a:rPr>
+              <a:t>template &lt;</a:t>
+            </a:r>
+            <a:r>
+              <a:rPr lang="en-US">
+                <a:latin typeface="Consolas" panose="020B0609020204030204" pitchFamily="49" charset="0"/>
+              </a:rPr>
+              <a:t>typename </a:t>
+            </a:r>
+            <a:r>
+              <a:rPr lang="en-US" smtClean="0">
+                <a:latin typeface="Consolas" panose="020B0609020204030204" pitchFamily="49" charset="0"/>
+              </a:rPr>
+              <a:t>... Ts&gt; </a:t>
+            </a:r>
+            <a:r>
+              <a:rPr lang="en-US">
+                <a:latin typeface="Consolas" panose="020B0609020204030204" pitchFamily="49" charset="0"/>
+              </a:rPr>
+              <a:t>class </a:t>
+            </a:r>
+            <a:r>
+              <a:rPr lang="en-US" smtClean="0">
+                <a:latin typeface="Consolas" panose="020B0609020204030204" pitchFamily="49" charset="0"/>
+              </a:rPr>
+              <a:t>MTree;</a:t>
+            </a:r>
+            <a:endParaRPr lang="en-US">
+              <a:latin typeface="Consolas" panose="020B0609020204030204" pitchFamily="49" charset="0"/>
+            </a:endParaRPr>
+          </a:p>
+          <a:p>
+            <a:r>
+              <a:rPr lang="ru-RU" smtClean="0"/>
+              <a:t>Типы не связаны никакими соотношениями</a:t>
+            </a:r>
+            <a:endParaRPr lang="ru-RU" smtClean="0">
+              <a:latin typeface="Consolas" panose="020B0609020204030204" pitchFamily="49" charset="0"/>
+            </a:endParaRPr>
+          </a:p>
+          <a:p>
+            <a:pPr marL="45720" indent="0">
+              <a:buNone/>
+            </a:pPr>
+            <a:r>
+              <a:rPr lang="en-US" smtClean="0">
+                <a:latin typeface="Consolas" panose="020B0609020204030204" pitchFamily="49" charset="0"/>
+              </a:rPr>
+              <a:t>class Circle {};</a:t>
+            </a:r>
+          </a:p>
+          <a:p>
+            <a:pPr marL="45720" indent="0">
+              <a:buNone/>
+            </a:pPr>
+            <a:r>
+              <a:rPr lang="en-US" smtClean="0">
+                <a:latin typeface="Consolas" panose="020B0609020204030204" pitchFamily="49" charset="0"/>
+              </a:rPr>
+              <a:t>class Square {};</a:t>
+            </a:r>
+          </a:p>
+          <a:p>
+            <a:pPr marL="45720" indent="0">
+              <a:buNone/>
+            </a:pPr>
+            <a:r>
+              <a:rPr lang="en-US" smtClean="0">
+                <a:latin typeface="Consolas" panose="020B0609020204030204" pitchFamily="49" charset="0"/>
+              </a:rPr>
+              <a:t>class Romb {};</a:t>
+            </a:r>
+          </a:p>
+          <a:p>
+            <a:pPr marL="45720" indent="0">
+              <a:buNone/>
+            </a:pPr>
+            <a:r>
+              <a:rPr lang="en-US" smtClean="0">
+                <a:latin typeface="Consolas" panose="020B0609020204030204" pitchFamily="49" charset="0"/>
+              </a:rPr>
+              <a:t>MTree&lt;Circle, Square, Romb&gt; m;</a:t>
+            </a:r>
+            <a:endParaRPr lang="ru-RU">
+              <a:latin typeface="Consolas" panose="020B0609020204030204" pitchFamily="49" charset="0"/>
+            </a:endParaRPr>
+          </a:p>
+          <a:p>
+            <a:r>
+              <a:rPr lang="ru-RU" smtClean="0"/>
+              <a:t>Типы </a:t>
+            </a:r>
+            <a:r>
+              <a:rPr lang="ru-RU" smtClean="0">
+                <a:solidFill>
+                  <a:srgbClr val="FF0000"/>
+                </a:solidFill>
+              </a:rPr>
+              <a:t>не наследуют</a:t>
+            </a:r>
+            <a:r>
+              <a:rPr lang="ru-RU" smtClean="0"/>
+              <a:t> от общего предка</a:t>
+            </a:r>
+            <a:endParaRPr lang="en-US"/>
+          </a:p>
+        </p:txBody>
+      </p:sp>
+      <p:sp>
+        <p:nvSpPr>
+          <p:cNvPr id="8" name="Rectangle 7"/>
+          <p:cNvSpPr/>
+          <p:nvPr/>
+        </p:nvSpPr>
+        <p:spPr>
+          <a:xfrm>
+            <a:off x="8628888" y="2916936"/>
+            <a:ext cx="548640" cy="548640"/>
+          </a:xfrm>
+          <a:prstGeom prst="rect">
+            <a:avLst/>
+          </a:prstGeom>
+          <a:solidFill>
+            <a:srgbClr val="00B0F0"/>
+          </a:solidFill>
+          <a:ln>
+            <a:solidFill>
+              <a:schemeClr val="tx1"/>
+            </a:solidFill>
+          </a:ln>
+        </p:spPr>
+        <p:style>
+          <a:lnRef idx="2">
+            <a:schemeClr val="accent1">
+              <a:shade val="50000"/>
+            </a:schemeClr>
+          </a:lnRef>
+          <a:fillRef idx="1">
+            <a:schemeClr val="accent1"/>
+          </a:fillRef>
+          <a:effectRef idx="0">
+            <a:schemeClr val="accent1"/>
+          </a:effectRef>
+          <a:fontRef idx="minor">
+            <a:schemeClr val="lt1"/>
+          </a:fontRef>
+        </p:style>
+        <p:txBody>
+          <a:bodyPr rtlCol="0" anchor="ctr"/>
+          <a:lstStyle/>
+          <a:p>
+            <a:pPr algn="ctr"/>
+            <a:endParaRPr lang="en-US"/>
+          </a:p>
+        </p:txBody>
+      </p:sp>
+      <p:sp>
+        <p:nvSpPr>
+          <p:cNvPr id="9" name="Oval 8"/>
+          <p:cNvSpPr/>
+          <p:nvPr/>
+        </p:nvSpPr>
+        <p:spPr>
+          <a:xfrm>
+            <a:off x="7984744" y="3907618"/>
+            <a:ext cx="548640" cy="548640"/>
+          </a:xfrm>
+          <a:prstGeom prst="ellipse">
+            <a:avLst/>
+          </a:prstGeom>
+          <a:solidFill>
+            <a:srgbClr val="00B0F0"/>
+          </a:solidFill>
+          <a:ln>
+            <a:solidFill>
+              <a:schemeClr val="tx1"/>
+            </a:solidFill>
+          </a:ln>
+        </p:spPr>
+        <p:style>
+          <a:lnRef idx="2">
+            <a:schemeClr val="accent1">
+              <a:shade val="50000"/>
+            </a:schemeClr>
+          </a:lnRef>
+          <a:fillRef idx="1">
+            <a:schemeClr val="accent1"/>
+          </a:fillRef>
+          <a:effectRef idx="0">
+            <a:schemeClr val="accent1"/>
+          </a:effectRef>
+          <a:fontRef idx="minor">
+            <a:schemeClr val="lt1"/>
+          </a:fontRef>
+        </p:style>
+        <p:txBody>
+          <a:bodyPr rtlCol="0" anchor="ctr"/>
+          <a:lstStyle/>
+          <a:p>
+            <a:pPr algn="ctr"/>
+            <a:endParaRPr lang="en-US"/>
+          </a:p>
+        </p:txBody>
+      </p:sp>
+      <p:sp>
+        <p:nvSpPr>
+          <p:cNvPr id="10" name="Diamond 9"/>
+          <p:cNvSpPr/>
+          <p:nvPr/>
+        </p:nvSpPr>
+        <p:spPr>
+          <a:xfrm>
+            <a:off x="9385291" y="3874049"/>
+            <a:ext cx="548640" cy="548640"/>
+          </a:xfrm>
+          <a:prstGeom prst="diamond">
+            <a:avLst/>
+          </a:prstGeom>
+          <a:solidFill>
+            <a:srgbClr val="00B0F0"/>
+          </a:solidFill>
+          <a:ln>
+            <a:solidFill>
+              <a:schemeClr val="tx1"/>
+            </a:solidFill>
+          </a:ln>
+        </p:spPr>
+        <p:style>
+          <a:lnRef idx="2">
+            <a:schemeClr val="accent1">
+              <a:shade val="50000"/>
+            </a:schemeClr>
+          </a:lnRef>
+          <a:fillRef idx="1">
+            <a:schemeClr val="accent1"/>
+          </a:fillRef>
+          <a:effectRef idx="0">
+            <a:schemeClr val="accent1"/>
+          </a:effectRef>
+          <a:fontRef idx="minor">
+            <a:schemeClr val="lt1"/>
+          </a:fontRef>
+        </p:style>
+        <p:txBody>
+          <a:bodyPr rtlCol="0" anchor="ctr"/>
+          <a:lstStyle/>
+          <a:p>
+            <a:pPr algn="ctr"/>
+            <a:endParaRPr lang="en-US"/>
+          </a:p>
+        </p:txBody>
+      </p:sp>
+      <p:sp>
+        <p:nvSpPr>
+          <p:cNvPr id="11" name="Oval 10"/>
+          <p:cNvSpPr/>
+          <p:nvPr/>
+        </p:nvSpPr>
+        <p:spPr>
+          <a:xfrm>
+            <a:off x="8890798" y="4924552"/>
+            <a:ext cx="548640" cy="548640"/>
+          </a:xfrm>
+          <a:prstGeom prst="ellipse">
+            <a:avLst/>
+          </a:prstGeom>
+          <a:solidFill>
+            <a:srgbClr val="00B0F0"/>
+          </a:solidFill>
+          <a:ln>
+            <a:solidFill>
+              <a:schemeClr val="tx1"/>
+            </a:solidFill>
+          </a:ln>
+        </p:spPr>
+        <p:style>
+          <a:lnRef idx="2">
+            <a:schemeClr val="accent1">
+              <a:shade val="50000"/>
+            </a:schemeClr>
+          </a:lnRef>
+          <a:fillRef idx="1">
+            <a:schemeClr val="accent1"/>
+          </a:fillRef>
+          <a:effectRef idx="0">
+            <a:schemeClr val="accent1"/>
+          </a:effectRef>
+          <a:fontRef idx="minor">
+            <a:schemeClr val="lt1"/>
+          </a:fontRef>
+        </p:style>
+        <p:txBody>
+          <a:bodyPr rtlCol="0" anchor="ctr"/>
+          <a:lstStyle/>
+          <a:p>
+            <a:pPr algn="ctr"/>
+            <a:endParaRPr lang="en-US"/>
+          </a:p>
+        </p:txBody>
+      </p:sp>
+      <p:sp>
+        <p:nvSpPr>
+          <p:cNvPr id="12" name="Rectangle 11"/>
+          <p:cNvSpPr/>
+          <p:nvPr/>
+        </p:nvSpPr>
+        <p:spPr>
+          <a:xfrm>
+            <a:off x="9888311" y="5117592"/>
+            <a:ext cx="548640" cy="548640"/>
+          </a:xfrm>
+          <a:prstGeom prst="rect">
+            <a:avLst/>
+          </a:prstGeom>
+          <a:solidFill>
+            <a:srgbClr val="00B0F0"/>
+          </a:solidFill>
+          <a:ln>
+            <a:solidFill>
+              <a:schemeClr val="tx1"/>
+            </a:solidFill>
+          </a:ln>
+        </p:spPr>
+        <p:style>
+          <a:lnRef idx="2">
+            <a:schemeClr val="accent1">
+              <a:shade val="50000"/>
+            </a:schemeClr>
+          </a:lnRef>
+          <a:fillRef idx="1">
+            <a:schemeClr val="accent1"/>
+          </a:fillRef>
+          <a:effectRef idx="0">
+            <a:schemeClr val="accent1"/>
+          </a:effectRef>
+          <a:fontRef idx="minor">
+            <a:schemeClr val="lt1"/>
+          </a:fontRef>
+        </p:style>
+        <p:txBody>
+          <a:bodyPr rtlCol="0" anchor="ctr"/>
+          <a:lstStyle/>
+          <a:p>
+            <a:pPr algn="ctr"/>
+            <a:endParaRPr lang="en-US"/>
+          </a:p>
+        </p:txBody>
+      </p:sp>
+      <p:cxnSp>
+        <p:nvCxnSpPr>
+          <p:cNvPr id="14" name="Straight Arrow Connector 13"/>
+          <p:cNvCxnSpPr>
+            <a:stCxn id="8" idx="2"/>
+            <a:endCxn id="9" idx="7"/>
+          </p:cNvCxnSpPr>
+          <p:nvPr/>
+        </p:nvCxnSpPr>
+        <p:spPr>
+          <a:xfrm flipH="1">
+            <a:off x="8453038" y="3465576"/>
+            <a:ext cx="450170" cy="522388"/>
+          </a:xfrm>
+          <a:prstGeom prst="straightConnector1">
+            <a:avLst/>
+          </a:prstGeom>
+          <a:ln w="28575">
+            <a:solidFill>
+              <a:schemeClr val="tx1"/>
+            </a:solidFill>
+            <a:tailEnd type="stealth" w="lg" len="lg"/>
+          </a:ln>
+        </p:spPr>
+        <p:style>
+          <a:lnRef idx="1">
+            <a:schemeClr val="accent1"/>
+          </a:lnRef>
+          <a:fillRef idx="0">
+            <a:schemeClr val="accent1"/>
+          </a:fillRef>
+          <a:effectRef idx="0">
+            <a:schemeClr val="accent1"/>
+          </a:effectRef>
+          <a:fontRef idx="minor">
+            <a:schemeClr val="tx1"/>
+          </a:fontRef>
+        </p:style>
+      </p:cxnSp>
+      <p:cxnSp>
+        <p:nvCxnSpPr>
+          <p:cNvPr id="17" name="Straight Arrow Connector 16"/>
+          <p:cNvCxnSpPr>
+            <a:stCxn id="8" idx="2"/>
+            <a:endCxn id="10" idx="0"/>
+          </p:cNvCxnSpPr>
+          <p:nvPr/>
+        </p:nvCxnSpPr>
+        <p:spPr>
+          <a:xfrm>
+            <a:off x="8903208" y="3465576"/>
+            <a:ext cx="756403" cy="408473"/>
+          </a:xfrm>
+          <a:prstGeom prst="straightConnector1">
+            <a:avLst/>
+          </a:prstGeom>
+          <a:ln w="28575">
+            <a:solidFill>
+              <a:schemeClr val="tx1"/>
+            </a:solidFill>
+            <a:tailEnd type="stealth" w="lg" len="lg"/>
+          </a:ln>
+        </p:spPr>
+        <p:style>
+          <a:lnRef idx="1">
+            <a:schemeClr val="accent1"/>
+          </a:lnRef>
+          <a:fillRef idx="0">
+            <a:schemeClr val="accent1"/>
+          </a:fillRef>
+          <a:effectRef idx="0">
+            <a:schemeClr val="accent1"/>
+          </a:effectRef>
+          <a:fontRef idx="minor">
+            <a:schemeClr val="tx1"/>
+          </a:fontRef>
+        </p:style>
+      </p:cxnSp>
+      <p:cxnSp>
+        <p:nvCxnSpPr>
+          <p:cNvPr id="20" name="Straight Arrow Connector 19"/>
+          <p:cNvCxnSpPr>
+            <a:stCxn id="10" idx="2"/>
+            <a:endCxn id="11" idx="0"/>
+          </p:cNvCxnSpPr>
+          <p:nvPr/>
+        </p:nvCxnSpPr>
+        <p:spPr>
+          <a:xfrm flipH="1">
+            <a:off x="9165118" y="4422689"/>
+            <a:ext cx="494493" cy="501863"/>
+          </a:xfrm>
+          <a:prstGeom prst="straightConnector1">
+            <a:avLst/>
+          </a:prstGeom>
+          <a:ln w="28575">
+            <a:solidFill>
+              <a:schemeClr val="tx1"/>
+            </a:solidFill>
+            <a:tailEnd type="stealth" w="lg" len="lg"/>
+          </a:ln>
+        </p:spPr>
+        <p:style>
+          <a:lnRef idx="1">
+            <a:schemeClr val="accent1"/>
+          </a:lnRef>
+          <a:fillRef idx="0">
+            <a:schemeClr val="accent1"/>
+          </a:fillRef>
+          <a:effectRef idx="0">
+            <a:schemeClr val="accent1"/>
+          </a:effectRef>
+          <a:fontRef idx="minor">
+            <a:schemeClr val="tx1"/>
+          </a:fontRef>
+        </p:style>
+      </p:cxnSp>
+      <p:cxnSp>
+        <p:nvCxnSpPr>
+          <p:cNvPr id="23" name="Straight Arrow Connector 22"/>
+          <p:cNvCxnSpPr>
+            <a:stCxn id="10" idx="2"/>
+            <a:endCxn id="12" idx="0"/>
+          </p:cNvCxnSpPr>
+          <p:nvPr/>
+        </p:nvCxnSpPr>
+        <p:spPr>
+          <a:xfrm>
+            <a:off x="9659611" y="4422689"/>
+            <a:ext cx="503020" cy="694903"/>
+          </a:xfrm>
+          <a:prstGeom prst="straightConnector1">
+            <a:avLst/>
+          </a:prstGeom>
+          <a:ln w="28575">
+            <a:solidFill>
+              <a:schemeClr val="tx1"/>
+            </a:solidFill>
+            <a:tailEnd type="stealth" w="lg" len="lg"/>
+          </a:ln>
+        </p:spPr>
+        <p:style>
+          <a:lnRef idx="1">
+            <a:schemeClr val="accent1"/>
+          </a:lnRef>
+          <a:fillRef idx="0">
+            <a:schemeClr val="accent1"/>
+          </a:fillRef>
+          <a:effectRef idx="0">
+            <a:schemeClr val="accent1"/>
+          </a:effectRef>
+          <a:fontRef idx="minor">
+            <a:schemeClr val="tx1"/>
+          </a:fontRef>
+        </p:style>
+      </p:cxnSp>
+      <p:sp>
+        <p:nvSpPr>
+          <p:cNvPr id="33" name="Rectangle 32"/>
+          <p:cNvSpPr/>
+          <p:nvPr/>
+        </p:nvSpPr>
+        <p:spPr>
+          <a:xfrm>
+            <a:off x="7843402" y="5001809"/>
+            <a:ext cx="548640" cy="548640"/>
+          </a:xfrm>
+          <a:prstGeom prst="rect">
+            <a:avLst/>
+          </a:prstGeom>
+          <a:solidFill>
+            <a:srgbClr val="00B0F0"/>
+          </a:solidFill>
+          <a:ln>
+            <a:solidFill>
+              <a:schemeClr val="tx1"/>
+            </a:solidFill>
+          </a:ln>
+        </p:spPr>
+        <p:style>
+          <a:lnRef idx="2">
+            <a:schemeClr val="accent1">
+              <a:shade val="50000"/>
+            </a:schemeClr>
+          </a:lnRef>
+          <a:fillRef idx="1">
+            <a:schemeClr val="accent1"/>
+          </a:fillRef>
+          <a:effectRef idx="0">
+            <a:schemeClr val="accent1"/>
+          </a:effectRef>
+          <a:fontRef idx="minor">
+            <a:schemeClr val="lt1"/>
+          </a:fontRef>
+        </p:style>
+        <p:txBody>
+          <a:bodyPr rtlCol="0" anchor="ctr"/>
+          <a:lstStyle/>
+          <a:p>
+            <a:pPr algn="ctr"/>
+            <a:endParaRPr lang="en-US"/>
+          </a:p>
+        </p:txBody>
+      </p:sp>
+      <p:cxnSp>
+        <p:nvCxnSpPr>
+          <p:cNvPr id="34" name="Straight Arrow Connector 33"/>
+          <p:cNvCxnSpPr>
+            <a:stCxn id="9" idx="4"/>
+            <a:endCxn id="33" idx="0"/>
+          </p:cNvCxnSpPr>
+          <p:nvPr/>
+        </p:nvCxnSpPr>
+        <p:spPr>
+          <a:xfrm flipH="1">
+            <a:off x="8117722" y="4456258"/>
+            <a:ext cx="141342" cy="545551"/>
+          </a:xfrm>
+          <a:prstGeom prst="straightConnector1">
+            <a:avLst/>
+          </a:prstGeom>
+          <a:ln w="28575">
+            <a:solidFill>
+              <a:schemeClr val="tx1"/>
+            </a:solidFill>
+            <a:tailEnd type="stealth" w="lg" len="lg"/>
+          </a:ln>
+        </p:spPr>
+        <p:style>
+          <a:lnRef idx="1">
+            <a:schemeClr val="accent1"/>
+          </a:lnRef>
+          <a:fillRef idx="0">
+            <a:schemeClr val="accent1"/>
+          </a:fillRef>
+          <a:effectRef idx="0">
+            <a:schemeClr val="accent1"/>
+          </a:effectRef>
+          <a:fontRef idx="minor">
+            <a:schemeClr val="tx1"/>
+          </a:fontRef>
+        </p:style>
+      </p:cxnSp>
+    </p:spTree>
+    <p:extLst>
+      <p:ext uri="{BB962C8B-B14F-4D97-AF65-F5344CB8AC3E}">
+        <p14:creationId xmlns:p14="http://schemas.microsoft.com/office/powerpoint/2010/main" val="1833617133"/>
+      </p:ext>
+    </p:extLst>
+  </p:cSld>
+  <p:clrMapOvr>
+    <a:masterClrMapping/>
+  </p:clrMapOvr>
+</p:sld>
+</file>
+
+<file path=ppt/slides/slide63.xml><?xml version="1.0" encoding="utf-8"?>
+<p:sld xmlns:a="http://schemas.openxmlformats.org/drawingml/2006/main" xmlns:r="http://schemas.openxmlformats.org/officeDocument/2006/relationships" xmlns:p="http://schemas.openxmlformats.org/presentationml/2006/main">
+  <p:cSld>
+    <p:spTree>
+      <p:nvGrpSpPr>
+        <p:cNvPr id="1" name=""/>
+        <p:cNvGrpSpPr/>
+        <p:nvPr/>
+      </p:nvGrpSpPr>
+      <p:grpSpPr>
+        <a:xfrm>
+          <a:off x="0" y="0"/>
+          <a:ext cx="0" cy="0"/>
+          <a:chOff x="0" y="0"/>
+          <a:chExt cx="0" cy="0"/>
+        </a:xfrm>
+      </p:grpSpPr>
+      <p:sp>
+        <p:nvSpPr>
+          <p:cNvPr id="6" name="Title 5"/>
+          <p:cNvSpPr>
+            <a:spLocks noGrp="1"/>
+          </p:cNvSpPr>
+          <p:nvPr>
+            <p:ph type="title"/>
+          </p:nvPr>
+        </p:nvSpPr>
+        <p:spPr/>
+        <p:txBody>
+          <a:bodyPr/>
+          <a:lstStyle/>
+          <a:p>
+            <a:r>
+              <a:rPr lang="en-US" smtClean="0"/>
+              <a:t>PA</a:t>
+            </a:r>
+            <a:r>
+              <a:rPr lang="ru-RU" smtClean="0"/>
+              <a:t>2</a:t>
+            </a:r>
+            <a:r>
+              <a:rPr lang="en-US" smtClean="0"/>
+              <a:t> </a:t>
+            </a:r>
+            <a:r>
+              <a:rPr lang="en-US"/>
+              <a:t>:: </a:t>
+            </a:r>
+            <a:r>
+              <a:rPr lang="ru-RU"/>
+              <a:t>Разработка </a:t>
+            </a:r>
+            <a:r>
+              <a:rPr lang="ru-RU" smtClean="0"/>
+              <a:t>дерева</a:t>
+            </a:r>
+            <a:endParaRPr lang="en-US"/>
+          </a:p>
+        </p:txBody>
+      </p:sp>
+      <p:sp>
+        <p:nvSpPr>
+          <p:cNvPr id="7" name="Content Placeholder 6"/>
+          <p:cNvSpPr>
+            <a:spLocks noGrp="1"/>
+          </p:cNvSpPr>
+          <p:nvPr>
+            <p:ph idx="1"/>
+          </p:nvPr>
+        </p:nvSpPr>
+        <p:spPr/>
+        <p:txBody>
+          <a:bodyPr/>
+          <a:lstStyle/>
+          <a:p>
+            <a:r>
+              <a:rPr lang="ru-RU" smtClean="0"/>
+              <a:t>Задание: разработать вариабельно-шаблонный класс многосортного дерева</a:t>
+            </a:r>
+          </a:p>
+          <a:p>
+            <a:pPr marL="45720" indent="0">
+              <a:buNone/>
+            </a:pPr>
+            <a:r>
+              <a:rPr lang="en-US">
+                <a:latin typeface="Consolas" panose="020B0609020204030204" pitchFamily="49" charset="0"/>
+              </a:rPr>
+              <a:t>template &lt;</a:t>
+            </a:r>
+            <a:r>
+              <a:rPr lang="en-US">
+                <a:latin typeface="Consolas" panose="020B0609020204030204" pitchFamily="49" charset="0"/>
+              </a:rPr>
+              <a:t>typename </a:t>
+            </a:r>
+            <a:r>
+              <a:rPr lang="en-US" smtClean="0">
+                <a:latin typeface="Consolas" panose="020B0609020204030204" pitchFamily="49" charset="0"/>
+              </a:rPr>
+              <a:t>... Ts&gt; </a:t>
+            </a:r>
+            <a:r>
+              <a:rPr lang="en-US">
+                <a:latin typeface="Consolas" panose="020B0609020204030204" pitchFamily="49" charset="0"/>
+              </a:rPr>
+              <a:t>class </a:t>
+            </a:r>
+            <a:r>
+              <a:rPr lang="en-US" smtClean="0">
+                <a:latin typeface="Consolas" panose="020B0609020204030204" pitchFamily="49" charset="0"/>
+              </a:rPr>
+              <a:t>MTree;</a:t>
+            </a:r>
+            <a:endParaRPr lang="en-US">
+              <a:latin typeface="Consolas" panose="020B0609020204030204" pitchFamily="49" charset="0"/>
+            </a:endParaRPr>
+          </a:p>
+          <a:p>
+            <a:r>
+              <a:rPr lang="ru-RU" smtClean="0">
+                <a:solidFill>
+                  <a:srgbClr val="0000FF"/>
+                </a:solidFill>
+              </a:rPr>
+              <a:t>Обязательные требования</a:t>
+            </a:r>
+          </a:p>
+          <a:p>
+            <a:pPr lvl="1"/>
+            <a:r>
+              <a:rPr lang="ru-RU" smtClean="0"/>
+              <a:t>Управление памятью</a:t>
+            </a:r>
+          </a:p>
+          <a:p>
+            <a:pPr lvl="2"/>
+            <a:r>
+              <a:rPr lang="ru-RU" smtClean="0"/>
+              <a:t>Либо управление памятью через умные указатели</a:t>
+            </a:r>
+          </a:p>
+          <a:p>
+            <a:pPr lvl="2"/>
+            <a:r>
+              <a:rPr lang="ru-RU" smtClean="0"/>
+              <a:t>Либо копирование, перемещение, </a:t>
+            </a:r>
+            <a:r>
+              <a:rPr lang="en-US" smtClean="0"/>
+              <a:t>etc.</a:t>
+            </a:r>
+          </a:p>
+          <a:p>
+            <a:pPr lvl="1"/>
+            <a:r>
+              <a:rPr lang="ru-RU" smtClean="0"/>
+              <a:t>Добавление и удаление элементов</a:t>
+            </a:r>
+          </a:p>
+          <a:p>
+            <a:pPr lvl="1"/>
+            <a:r>
+              <a:rPr lang="ru-RU" smtClean="0"/>
+              <a:t>Обход дерева (</a:t>
+            </a:r>
+            <a:r>
+              <a:rPr lang="en-US" smtClean="0"/>
+              <a:t>inorder, preorder, postorder)</a:t>
+            </a:r>
+          </a:p>
+          <a:p>
+            <a:pPr lvl="1"/>
+            <a:r>
+              <a:rPr lang="ru-RU" smtClean="0"/>
+              <a:t>Балансировка не нужна (представьте, что это </a:t>
+            </a:r>
+            <a:r>
+              <a:rPr lang="en-US" smtClean="0"/>
+              <a:t>AST)</a:t>
+            </a:r>
+          </a:p>
+          <a:p>
+            <a:pPr lvl="1"/>
+            <a:r>
+              <a:rPr lang="ru-RU" smtClean="0"/>
+              <a:t>Это должно быть честное дерево (хеш-таблицы,</a:t>
+            </a:r>
+            <a:r>
+              <a:rPr lang="en-US" smtClean="0"/>
+              <a:t/>
+            </a:r>
+            <a:br>
+              <a:rPr lang="en-US" smtClean="0"/>
+            </a:br>
+            <a:r>
+              <a:rPr lang="en-US" smtClean="0"/>
+              <a:t>slotmaps </a:t>
+            </a:r>
+            <a:r>
+              <a:rPr lang="ru-RU" smtClean="0"/>
+              <a:t>и всё такое недопустимы)</a:t>
+            </a:r>
+          </a:p>
+          <a:p>
+            <a:endParaRPr lang="en-US"/>
+          </a:p>
+        </p:txBody>
+      </p:sp>
+      <p:sp>
+        <p:nvSpPr>
+          <p:cNvPr id="8" name="Rectangle 7"/>
+          <p:cNvSpPr/>
+          <p:nvPr/>
+        </p:nvSpPr>
+        <p:spPr>
+          <a:xfrm>
+            <a:off x="8628888" y="2916936"/>
+            <a:ext cx="548640" cy="548640"/>
+          </a:xfrm>
+          <a:prstGeom prst="rect">
+            <a:avLst/>
+          </a:prstGeom>
+          <a:solidFill>
+            <a:srgbClr val="00B0F0"/>
+          </a:solidFill>
+          <a:ln>
+            <a:solidFill>
+              <a:schemeClr val="tx1"/>
+            </a:solidFill>
+          </a:ln>
+        </p:spPr>
+        <p:style>
+          <a:lnRef idx="2">
+            <a:schemeClr val="accent1">
+              <a:shade val="50000"/>
+            </a:schemeClr>
+          </a:lnRef>
+          <a:fillRef idx="1">
+            <a:schemeClr val="accent1"/>
+          </a:fillRef>
+          <a:effectRef idx="0">
+            <a:schemeClr val="accent1"/>
+          </a:effectRef>
+          <a:fontRef idx="minor">
+            <a:schemeClr val="lt1"/>
+          </a:fontRef>
+        </p:style>
+        <p:txBody>
+          <a:bodyPr rtlCol="0" anchor="ctr"/>
+          <a:lstStyle/>
+          <a:p>
+            <a:pPr algn="ctr"/>
+            <a:endParaRPr lang="en-US"/>
+          </a:p>
+        </p:txBody>
+      </p:sp>
+      <p:sp>
+        <p:nvSpPr>
+          <p:cNvPr id="9" name="Oval 8"/>
+          <p:cNvSpPr/>
+          <p:nvPr/>
+        </p:nvSpPr>
+        <p:spPr>
+          <a:xfrm>
+            <a:off x="7984744" y="3907618"/>
+            <a:ext cx="548640" cy="548640"/>
+          </a:xfrm>
+          <a:prstGeom prst="ellipse">
+            <a:avLst/>
+          </a:prstGeom>
+          <a:solidFill>
+            <a:srgbClr val="00B0F0"/>
+          </a:solidFill>
+          <a:ln>
+            <a:solidFill>
+              <a:schemeClr val="tx1"/>
+            </a:solidFill>
+          </a:ln>
+        </p:spPr>
+        <p:style>
+          <a:lnRef idx="2">
+            <a:schemeClr val="accent1">
+              <a:shade val="50000"/>
+            </a:schemeClr>
+          </a:lnRef>
+          <a:fillRef idx="1">
+            <a:schemeClr val="accent1"/>
+          </a:fillRef>
+          <a:effectRef idx="0">
+            <a:schemeClr val="accent1"/>
+          </a:effectRef>
+          <a:fontRef idx="minor">
+            <a:schemeClr val="lt1"/>
+          </a:fontRef>
+        </p:style>
+        <p:txBody>
+          <a:bodyPr rtlCol="0" anchor="ctr"/>
+          <a:lstStyle/>
+          <a:p>
+            <a:pPr algn="ctr"/>
+            <a:endParaRPr lang="en-US"/>
+          </a:p>
+        </p:txBody>
+      </p:sp>
+      <p:sp>
+        <p:nvSpPr>
+          <p:cNvPr id="10" name="Diamond 9"/>
+          <p:cNvSpPr/>
+          <p:nvPr/>
+        </p:nvSpPr>
+        <p:spPr>
+          <a:xfrm>
+            <a:off x="9385291" y="3874049"/>
+            <a:ext cx="548640" cy="548640"/>
+          </a:xfrm>
+          <a:prstGeom prst="diamond">
+            <a:avLst/>
+          </a:prstGeom>
+          <a:solidFill>
+            <a:srgbClr val="00B0F0"/>
+          </a:solidFill>
+          <a:ln>
+            <a:solidFill>
+              <a:schemeClr val="tx1"/>
+            </a:solidFill>
+          </a:ln>
+        </p:spPr>
+        <p:style>
+          <a:lnRef idx="2">
+            <a:schemeClr val="accent1">
+              <a:shade val="50000"/>
+            </a:schemeClr>
+          </a:lnRef>
+          <a:fillRef idx="1">
+            <a:schemeClr val="accent1"/>
+          </a:fillRef>
+          <a:effectRef idx="0">
+            <a:schemeClr val="accent1"/>
+          </a:effectRef>
+          <a:fontRef idx="minor">
+            <a:schemeClr val="lt1"/>
+          </a:fontRef>
+        </p:style>
+        <p:txBody>
+          <a:bodyPr rtlCol="0" anchor="ctr"/>
+          <a:lstStyle/>
+          <a:p>
+            <a:pPr algn="ctr"/>
+            <a:endParaRPr lang="en-US"/>
+          </a:p>
+        </p:txBody>
+      </p:sp>
+      <p:sp>
+        <p:nvSpPr>
+          <p:cNvPr id="11" name="Oval 10"/>
+          <p:cNvSpPr/>
+          <p:nvPr/>
+        </p:nvSpPr>
+        <p:spPr>
+          <a:xfrm>
+            <a:off x="8890798" y="4924552"/>
+            <a:ext cx="548640" cy="548640"/>
+          </a:xfrm>
+          <a:prstGeom prst="ellipse">
+            <a:avLst/>
+          </a:prstGeom>
+          <a:solidFill>
+            <a:srgbClr val="00B0F0"/>
+          </a:solidFill>
+          <a:ln>
+            <a:solidFill>
+              <a:schemeClr val="tx1"/>
+            </a:solidFill>
+          </a:ln>
+        </p:spPr>
+        <p:style>
+          <a:lnRef idx="2">
+            <a:schemeClr val="accent1">
+              <a:shade val="50000"/>
+            </a:schemeClr>
+          </a:lnRef>
+          <a:fillRef idx="1">
+            <a:schemeClr val="accent1"/>
+          </a:fillRef>
+          <a:effectRef idx="0">
+            <a:schemeClr val="accent1"/>
+          </a:effectRef>
+          <a:fontRef idx="minor">
+            <a:schemeClr val="lt1"/>
+          </a:fontRef>
+        </p:style>
+        <p:txBody>
+          <a:bodyPr rtlCol="0" anchor="ctr"/>
+          <a:lstStyle/>
+          <a:p>
+            <a:pPr algn="ctr"/>
+            <a:endParaRPr lang="en-US"/>
+          </a:p>
+        </p:txBody>
+      </p:sp>
+      <p:sp>
+        <p:nvSpPr>
+          <p:cNvPr id="12" name="Rectangle 11"/>
+          <p:cNvSpPr/>
+          <p:nvPr/>
+        </p:nvSpPr>
+        <p:spPr>
+          <a:xfrm>
+            <a:off x="9888311" y="5117592"/>
+            <a:ext cx="548640" cy="548640"/>
+          </a:xfrm>
+          <a:prstGeom prst="rect">
+            <a:avLst/>
+          </a:prstGeom>
+          <a:solidFill>
+            <a:srgbClr val="00B0F0"/>
+          </a:solidFill>
+          <a:ln>
+            <a:solidFill>
+              <a:schemeClr val="tx1"/>
+            </a:solidFill>
+          </a:ln>
+        </p:spPr>
+        <p:style>
+          <a:lnRef idx="2">
+            <a:schemeClr val="accent1">
+              <a:shade val="50000"/>
+            </a:schemeClr>
+          </a:lnRef>
+          <a:fillRef idx="1">
+            <a:schemeClr val="accent1"/>
+          </a:fillRef>
+          <a:effectRef idx="0">
+            <a:schemeClr val="accent1"/>
+          </a:effectRef>
+          <a:fontRef idx="minor">
+            <a:schemeClr val="lt1"/>
+          </a:fontRef>
+        </p:style>
+        <p:txBody>
+          <a:bodyPr rtlCol="0" anchor="ctr"/>
+          <a:lstStyle/>
+          <a:p>
+            <a:pPr algn="ctr"/>
+            <a:endParaRPr lang="en-US"/>
+          </a:p>
+        </p:txBody>
+      </p:sp>
+      <p:cxnSp>
+        <p:nvCxnSpPr>
+          <p:cNvPr id="14" name="Straight Arrow Connector 13"/>
+          <p:cNvCxnSpPr>
+            <a:stCxn id="8" idx="2"/>
+            <a:endCxn id="9" idx="7"/>
+          </p:cNvCxnSpPr>
+          <p:nvPr/>
+        </p:nvCxnSpPr>
+        <p:spPr>
+          <a:xfrm flipH="1">
+            <a:off x="8453038" y="3465576"/>
+            <a:ext cx="450170" cy="522388"/>
+          </a:xfrm>
+          <a:prstGeom prst="straightConnector1">
+            <a:avLst/>
+          </a:prstGeom>
+          <a:ln w="28575">
+            <a:solidFill>
+              <a:schemeClr val="tx1"/>
+            </a:solidFill>
+            <a:tailEnd type="stealth" w="lg" len="lg"/>
+          </a:ln>
+        </p:spPr>
+        <p:style>
+          <a:lnRef idx="1">
+            <a:schemeClr val="accent1"/>
+          </a:lnRef>
+          <a:fillRef idx="0">
+            <a:schemeClr val="accent1"/>
+          </a:fillRef>
+          <a:effectRef idx="0">
+            <a:schemeClr val="accent1"/>
+          </a:effectRef>
+          <a:fontRef idx="minor">
+            <a:schemeClr val="tx1"/>
+          </a:fontRef>
+        </p:style>
+      </p:cxnSp>
+      <p:cxnSp>
+        <p:nvCxnSpPr>
+          <p:cNvPr id="17" name="Straight Arrow Connector 16"/>
+          <p:cNvCxnSpPr>
+            <a:stCxn id="8" idx="2"/>
+            <a:endCxn id="10" idx="0"/>
+          </p:cNvCxnSpPr>
+          <p:nvPr/>
+        </p:nvCxnSpPr>
+        <p:spPr>
+          <a:xfrm>
+            <a:off x="8903208" y="3465576"/>
+            <a:ext cx="756403" cy="408473"/>
+          </a:xfrm>
+          <a:prstGeom prst="straightConnector1">
+            <a:avLst/>
+          </a:prstGeom>
+          <a:ln w="28575">
+            <a:solidFill>
+              <a:schemeClr val="tx1"/>
+            </a:solidFill>
+            <a:tailEnd type="stealth" w="lg" len="lg"/>
+          </a:ln>
+        </p:spPr>
+        <p:style>
+          <a:lnRef idx="1">
+            <a:schemeClr val="accent1"/>
+          </a:lnRef>
+          <a:fillRef idx="0">
+            <a:schemeClr val="accent1"/>
+          </a:fillRef>
+          <a:effectRef idx="0">
+            <a:schemeClr val="accent1"/>
+          </a:effectRef>
+          <a:fontRef idx="minor">
+            <a:schemeClr val="tx1"/>
+          </a:fontRef>
+        </p:style>
+      </p:cxnSp>
+      <p:cxnSp>
+        <p:nvCxnSpPr>
+          <p:cNvPr id="20" name="Straight Arrow Connector 19"/>
+          <p:cNvCxnSpPr>
+            <a:stCxn id="10" idx="2"/>
+            <a:endCxn id="11" idx="0"/>
+          </p:cNvCxnSpPr>
+          <p:nvPr/>
+        </p:nvCxnSpPr>
+        <p:spPr>
+          <a:xfrm flipH="1">
+            <a:off x="9165118" y="4422689"/>
+            <a:ext cx="494493" cy="501863"/>
+          </a:xfrm>
+          <a:prstGeom prst="straightConnector1">
+            <a:avLst/>
+          </a:prstGeom>
+          <a:ln w="28575">
+            <a:solidFill>
+              <a:schemeClr val="tx1"/>
+            </a:solidFill>
+            <a:tailEnd type="stealth" w="lg" len="lg"/>
+          </a:ln>
+        </p:spPr>
+        <p:style>
+          <a:lnRef idx="1">
+            <a:schemeClr val="accent1"/>
+          </a:lnRef>
+          <a:fillRef idx="0">
+            <a:schemeClr val="accent1"/>
+          </a:fillRef>
+          <a:effectRef idx="0">
+            <a:schemeClr val="accent1"/>
+          </a:effectRef>
+          <a:fontRef idx="minor">
+            <a:schemeClr val="tx1"/>
+          </a:fontRef>
+        </p:style>
+      </p:cxnSp>
+      <p:cxnSp>
+        <p:nvCxnSpPr>
+          <p:cNvPr id="23" name="Straight Arrow Connector 22"/>
+          <p:cNvCxnSpPr>
+            <a:stCxn id="10" idx="2"/>
+            <a:endCxn id="12" idx="0"/>
+          </p:cNvCxnSpPr>
+          <p:nvPr/>
+        </p:nvCxnSpPr>
+        <p:spPr>
+          <a:xfrm>
+            <a:off x="9659611" y="4422689"/>
+            <a:ext cx="503020" cy="694903"/>
+          </a:xfrm>
+          <a:prstGeom prst="straightConnector1">
+            <a:avLst/>
+          </a:prstGeom>
+          <a:ln w="28575">
+            <a:solidFill>
+              <a:schemeClr val="tx1"/>
+            </a:solidFill>
+            <a:tailEnd type="stealth" w="lg" len="lg"/>
+          </a:ln>
+        </p:spPr>
+        <p:style>
+          <a:lnRef idx="1">
+            <a:schemeClr val="accent1"/>
+          </a:lnRef>
+          <a:fillRef idx="0">
+            <a:schemeClr val="accent1"/>
+          </a:fillRef>
+          <a:effectRef idx="0">
+            <a:schemeClr val="accent1"/>
+          </a:effectRef>
+          <a:fontRef idx="minor">
+            <a:schemeClr val="tx1"/>
+          </a:fontRef>
+        </p:style>
+      </p:cxnSp>
+      <p:sp>
+        <p:nvSpPr>
+          <p:cNvPr id="33" name="Rectangle 32"/>
+          <p:cNvSpPr/>
+          <p:nvPr/>
+        </p:nvSpPr>
+        <p:spPr>
+          <a:xfrm>
+            <a:off x="7843402" y="5001809"/>
+            <a:ext cx="548640" cy="548640"/>
+          </a:xfrm>
+          <a:prstGeom prst="rect">
+            <a:avLst/>
+          </a:prstGeom>
+          <a:solidFill>
+            <a:srgbClr val="00B0F0"/>
+          </a:solidFill>
+          <a:ln>
+            <a:solidFill>
+              <a:schemeClr val="tx1"/>
+            </a:solidFill>
+          </a:ln>
+        </p:spPr>
+        <p:style>
+          <a:lnRef idx="2">
+            <a:schemeClr val="accent1">
+              <a:shade val="50000"/>
+            </a:schemeClr>
+          </a:lnRef>
+          <a:fillRef idx="1">
+            <a:schemeClr val="accent1"/>
+          </a:fillRef>
+          <a:effectRef idx="0">
+            <a:schemeClr val="accent1"/>
+          </a:effectRef>
+          <a:fontRef idx="minor">
+            <a:schemeClr val="lt1"/>
+          </a:fontRef>
+        </p:style>
+        <p:txBody>
+          <a:bodyPr rtlCol="0" anchor="ctr"/>
+          <a:lstStyle/>
+          <a:p>
+            <a:pPr algn="ctr"/>
+            <a:endParaRPr lang="en-US"/>
+          </a:p>
+        </p:txBody>
+      </p:sp>
+      <p:cxnSp>
+        <p:nvCxnSpPr>
+          <p:cNvPr id="34" name="Straight Arrow Connector 33"/>
+          <p:cNvCxnSpPr>
+            <a:stCxn id="9" idx="4"/>
+            <a:endCxn id="33" idx="0"/>
+          </p:cNvCxnSpPr>
+          <p:nvPr/>
+        </p:nvCxnSpPr>
+        <p:spPr>
+          <a:xfrm flipH="1">
+            <a:off x="8117722" y="4456258"/>
+            <a:ext cx="141342" cy="545551"/>
+          </a:xfrm>
+          <a:prstGeom prst="straightConnector1">
+            <a:avLst/>
+          </a:prstGeom>
+          <a:ln w="28575">
+            <a:solidFill>
+              <a:schemeClr val="tx1"/>
+            </a:solidFill>
+            <a:tailEnd type="stealth" w="lg" len="lg"/>
+          </a:ln>
+        </p:spPr>
+        <p:style>
+          <a:lnRef idx="1">
+            <a:schemeClr val="accent1"/>
+          </a:lnRef>
+          <a:fillRef idx="0">
+            <a:schemeClr val="accent1"/>
+          </a:fillRef>
+          <a:effectRef idx="0">
+            <a:schemeClr val="accent1"/>
+          </a:effectRef>
+          <a:fontRef idx="minor">
+            <a:schemeClr val="tx1"/>
+          </a:fontRef>
+        </p:style>
+      </p:cxnSp>
+    </p:spTree>
+    <p:extLst>
+      <p:ext uri="{BB962C8B-B14F-4D97-AF65-F5344CB8AC3E}">
+        <p14:creationId xmlns:p14="http://schemas.microsoft.com/office/powerpoint/2010/main" val="3504899546"/>
+      </p:ext>
+    </p:extLst>
+  </p:cSld>
+  <p:clrMapOvr>
+    <a:masterClrMapping/>
+  </p:clrMapOvr>
+</p:sld>
+</file>
+
+<file path=ppt/slides/slide64.xml><?xml version="1.0" encoding="utf-8"?>
+<p:sld xmlns:a="http://schemas.openxmlformats.org/drawingml/2006/main" xmlns:r="http://schemas.openxmlformats.org/officeDocument/2006/relationships" xmlns:p="http://schemas.openxmlformats.org/presentationml/2006/main">
+  <p:cSld>
+    <p:spTree>
+      <p:nvGrpSpPr>
+        <p:cNvPr id="1" name=""/>
+        <p:cNvGrpSpPr/>
+        <p:nvPr/>
+      </p:nvGrpSpPr>
+      <p:grpSpPr>
+        <a:xfrm>
+          <a:off x="0" y="0"/>
+          <a:ext cx="0" cy="0"/>
+          <a:chOff x="0" y="0"/>
+          <a:chExt cx="0" cy="0"/>
+        </a:xfrm>
+      </p:grpSpPr>
+      <p:sp>
+        <p:nvSpPr>
+          <p:cNvPr id="6" name="Title 5"/>
+          <p:cNvSpPr>
+            <a:spLocks noGrp="1"/>
+          </p:cNvSpPr>
+          <p:nvPr>
+            <p:ph type="title"/>
+          </p:nvPr>
+        </p:nvSpPr>
+        <p:spPr/>
+        <p:txBody>
+          <a:bodyPr/>
+          <a:lstStyle/>
+          <a:p>
+            <a:r>
+              <a:rPr lang="en-US" smtClean="0"/>
+              <a:t>PA</a:t>
+            </a:r>
+            <a:r>
+              <a:rPr lang="ru-RU" smtClean="0"/>
+              <a:t>2</a:t>
+            </a:r>
+            <a:r>
+              <a:rPr lang="en-US" smtClean="0"/>
+              <a:t> </a:t>
+            </a:r>
+            <a:r>
+              <a:rPr lang="en-US"/>
+              <a:t>:: </a:t>
+            </a:r>
+            <a:r>
+              <a:rPr lang="ru-RU"/>
+              <a:t>Разработка </a:t>
+            </a:r>
+            <a:r>
+              <a:rPr lang="ru-RU" smtClean="0"/>
+              <a:t>дерева</a:t>
+            </a:r>
+            <a:endParaRPr lang="en-US"/>
+          </a:p>
+        </p:txBody>
+      </p:sp>
+      <p:sp>
+        <p:nvSpPr>
+          <p:cNvPr id="7" name="Content Placeholder 6"/>
+          <p:cNvSpPr>
+            <a:spLocks noGrp="1"/>
+          </p:cNvSpPr>
+          <p:nvPr>
+            <p:ph idx="1"/>
+          </p:nvPr>
+        </p:nvSpPr>
+        <p:spPr/>
+        <p:txBody>
+          <a:bodyPr/>
+          <a:lstStyle/>
+          <a:p>
+            <a:r>
+              <a:rPr lang="ru-RU" smtClean="0"/>
+              <a:t>Задание: разработать вариабельно-шаблонный класс многосортного дерева</a:t>
+            </a:r>
+          </a:p>
+          <a:p>
+            <a:pPr marL="45720" indent="0">
+              <a:buNone/>
+            </a:pPr>
+            <a:r>
+              <a:rPr lang="en-US">
+                <a:latin typeface="Consolas" panose="020B0609020204030204" pitchFamily="49" charset="0"/>
+              </a:rPr>
+              <a:t>template &lt;</a:t>
+            </a:r>
+            <a:r>
+              <a:rPr lang="en-US">
+                <a:latin typeface="Consolas" panose="020B0609020204030204" pitchFamily="49" charset="0"/>
+              </a:rPr>
+              <a:t>typename </a:t>
+            </a:r>
+            <a:r>
+              <a:rPr lang="en-US" smtClean="0">
+                <a:latin typeface="Consolas" panose="020B0609020204030204" pitchFamily="49" charset="0"/>
+              </a:rPr>
+              <a:t>... Ts&gt; </a:t>
+            </a:r>
+            <a:r>
+              <a:rPr lang="en-US">
+                <a:latin typeface="Consolas" panose="020B0609020204030204" pitchFamily="49" charset="0"/>
+              </a:rPr>
+              <a:t>class </a:t>
+            </a:r>
+            <a:r>
+              <a:rPr lang="en-US" smtClean="0">
+                <a:latin typeface="Consolas" panose="020B0609020204030204" pitchFamily="49" charset="0"/>
+              </a:rPr>
+              <a:t>MTree;</a:t>
+            </a:r>
+            <a:endParaRPr lang="en-US">
+              <a:latin typeface="Consolas" panose="020B0609020204030204" pitchFamily="49" charset="0"/>
+            </a:endParaRPr>
+          </a:p>
+          <a:p>
+            <a:r>
+              <a:rPr lang="ru-RU" smtClean="0">
+                <a:solidFill>
+                  <a:srgbClr val="0000FF"/>
+                </a:solidFill>
+              </a:rPr>
+              <a:t>Следите за эффективностью</a:t>
+            </a:r>
+          </a:p>
+          <a:p>
+            <a:pPr lvl="1"/>
+            <a:r>
+              <a:rPr lang="ru-RU" smtClean="0"/>
+              <a:t>Хранить в узле следует не более чем максимальный </a:t>
+            </a:r>
+            <a:br>
+              <a:rPr lang="ru-RU" smtClean="0"/>
+            </a:br>
+            <a:r>
+              <a:rPr lang="ru-RU" smtClean="0"/>
+              <a:t>из переданных </a:t>
+            </a:r>
+            <a:r>
+              <a:rPr lang="en-US" smtClean="0"/>
+              <a:t>Ts (</a:t>
+            </a:r>
+            <a:r>
+              <a:rPr lang="ru-RU" smtClean="0"/>
+              <a:t>допустим </a:t>
+            </a:r>
+            <a:r>
+              <a:rPr lang="en-US" smtClean="0"/>
+              <a:t>union)</a:t>
+            </a:r>
+            <a:r>
+              <a:rPr lang="ru-RU" smtClean="0"/>
+              <a:t> + </a:t>
+            </a:r>
+            <a:r>
+              <a:rPr lang="en-US" smtClean="0"/>
+              <a:t>O(1)</a:t>
+            </a:r>
+          </a:p>
+          <a:p>
+            <a:pPr lvl="1"/>
+            <a:r>
+              <a:rPr lang="ru-RU" smtClean="0"/>
+              <a:t>Удаление дерева не должно переполнять стек</a:t>
+            </a:r>
+            <a:br>
+              <a:rPr lang="ru-RU" smtClean="0"/>
+            </a:br>
+            <a:r>
+              <a:rPr lang="ru-RU" smtClean="0"/>
+              <a:t>(в идеале должно быть не рекурсивным)</a:t>
+            </a:r>
+          </a:p>
+          <a:p>
+            <a:pPr lvl="1"/>
+            <a:r>
+              <a:rPr lang="ru-RU" smtClean="0"/>
+              <a:t>Обход дерева в идеале должен быть нерекурсивным</a:t>
+            </a:r>
+            <a:br>
+              <a:rPr lang="ru-RU" smtClean="0"/>
+            </a:br>
+            <a:r>
+              <a:rPr lang="ru-RU" smtClean="0"/>
+              <a:t>и занимать асимптотически разумное время</a:t>
+            </a:r>
+          </a:p>
+          <a:p>
+            <a:pPr lvl="1"/>
+            <a:r>
+              <a:rPr lang="ru-RU" smtClean="0"/>
+              <a:t>Не бойтесь писать тесты с действительно большими</a:t>
+            </a:r>
+            <a:br>
+              <a:rPr lang="ru-RU" smtClean="0"/>
+            </a:br>
+            <a:r>
+              <a:rPr lang="ru-RU" smtClean="0"/>
+              <a:t>многосортными деревьями (и генерировать их)</a:t>
+            </a:r>
+          </a:p>
+          <a:p>
+            <a:endParaRPr lang="en-US"/>
+          </a:p>
+        </p:txBody>
+      </p:sp>
+      <p:sp>
+        <p:nvSpPr>
+          <p:cNvPr id="8" name="Rectangle 7"/>
+          <p:cNvSpPr/>
+          <p:nvPr/>
+        </p:nvSpPr>
+        <p:spPr>
+          <a:xfrm>
+            <a:off x="8628888" y="2916936"/>
+            <a:ext cx="548640" cy="548640"/>
+          </a:xfrm>
+          <a:prstGeom prst="rect">
+            <a:avLst/>
+          </a:prstGeom>
+          <a:solidFill>
+            <a:srgbClr val="00B0F0"/>
+          </a:solidFill>
+          <a:ln>
+            <a:solidFill>
+              <a:schemeClr val="tx1"/>
+            </a:solidFill>
+          </a:ln>
+        </p:spPr>
+        <p:style>
+          <a:lnRef idx="2">
+            <a:schemeClr val="accent1">
+              <a:shade val="50000"/>
+            </a:schemeClr>
+          </a:lnRef>
+          <a:fillRef idx="1">
+            <a:schemeClr val="accent1"/>
+          </a:fillRef>
+          <a:effectRef idx="0">
+            <a:schemeClr val="accent1"/>
+          </a:effectRef>
+          <a:fontRef idx="minor">
+            <a:schemeClr val="lt1"/>
+          </a:fontRef>
+        </p:style>
+        <p:txBody>
+          <a:bodyPr rtlCol="0" anchor="ctr"/>
+          <a:lstStyle/>
+          <a:p>
+            <a:pPr algn="ctr"/>
+            <a:endParaRPr lang="en-US"/>
+          </a:p>
+        </p:txBody>
+      </p:sp>
+      <p:sp>
+        <p:nvSpPr>
+          <p:cNvPr id="9" name="Oval 8"/>
+          <p:cNvSpPr/>
+          <p:nvPr/>
+        </p:nvSpPr>
+        <p:spPr>
+          <a:xfrm>
+            <a:off x="7984744" y="3907618"/>
+            <a:ext cx="548640" cy="548640"/>
+          </a:xfrm>
+          <a:prstGeom prst="ellipse">
+            <a:avLst/>
+          </a:prstGeom>
+          <a:solidFill>
+            <a:srgbClr val="00B0F0"/>
+          </a:solidFill>
+          <a:ln>
+            <a:solidFill>
+              <a:schemeClr val="tx1"/>
+            </a:solidFill>
+          </a:ln>
+        </p:spPr>
+        <p:style>
+          <a:lnRef idx="2">
+            <a:schemeClr val="accent1">
+              <a:shade val="50000"/>
+            </a:schemeClr>
+          </a:lnRef>
+          <a:fillRef idx="1">
+            <a:schemeClr val="accent1"/>
+          </a:fillRef>
+          <a:effectRef idx="0">
+            <a:schemeClr val="accent1"/>
+          </a:effectRef>
+          <a:fontRef idx="minor">
+            <a:schemeClr val="lt1"/>
+          </a:fontRef>
+        </p:style>
+        <p:txBody>
+          <a:bodyPr rtlCol="0" anchor="ctr"/>
+          <a:lstStyle/>
+          <a:p>
+            <a:pPr algn="ctr"/>
+            <a:endParaRPr lang="en-US"/>
+          </a:p>
+        </p:txBody>
+      </p:sp>
+      <p:sp>
+        <p:nvSpPr>
+          <p:cNvPr id="10" name="Diamond 9"/>
+          <p:cNvSpPr/>
+          <p:nvPr/>
+        </p:nvSpPr>
+        <p:spPr>
+          <a:xfrm>
+            <a:off x="9385291" y="3874049"/>
+            <a:ext cx="548640" cy="548640"/>
+          </a:xfrm>
+          <a:prstGeom prst="diamond">
+            <a:avLst/>
+          </a:prstGeom>
+          <a:solidFill>
+            <a:srgbClr val="00B0F0"/>
+          </a:solidFill>
+          <a:ln>
+            <a:solidFill>
+              <a:schemeClr val="tx1"/>
+            </a:solidFill>
+          </a:ln>
+        </p:spPr>
+        <p:style>
+          <a:lnRef idx="2">
+            <a:schemeClr val="accent1">
+              <a:shade val="50000"/>
+            </a:schemeClr>
+          </a:lnRef>
+          <a:fillRef idx="1">
+            <a:schemeClr val="accent1"/>
+          </a:fillRef>
+          <a:effectRef idx="0">
+            <a:schemeClr val="accent1"/>
+          </a:effectRef>
+          <a:fontRef idx="minor">
+            <a:schemeClr val="lt1"/>
+          </a:fontRef>
+        </p:style>
+        <p:txBody>
+          <a:bodyPr rtlCol="0" anchor="ctr"/>
+          <a:lstStyle/>
+          <a:p>
+            <a:pPr algn="ctr"/>
+            <a:endParaRPr lang="en-US"/>
+          </a:p>
+        </p:txBody>
+      </p:sp>
+      <p:sp>
+        <p:nvSpPr>
+          <p:cNvPr id="11" name="Oval 10"/>
+          <p:cNvSpPr/>
+          <p:nvPr/>
+        </p:nvSpPr>
+        <p:spPr>
+          <a:xfrm>
+            <a:off x="8890798" y="4924552"/>
+            <a:ext cx="548640" cy="548640"/>
+          </a:xfrm>
+          <a:prstGeom prst="ellipse">
+            <a:avLst/>
+          </a:prstGeom>
+          <a:solidFill>
+            <a:srgbClr val="00B0F0"/>
+          </a:solidFill>
+          <a:ln>
+            <a:solidFill>
+              <a:schemeClr val="tx1"/>
+            </a:solidFill>
+          </a:ln>
+        </p:spPr>
+        <p:style>
+          <a:lnRef idx="2">
+            <a:schemeClr val="accent1">
+              <a:shade val="50000"/>
+            </a:schemeClr>
+          </a:lnRef>
+          <a:fillRef idx="1">
+            <a:schemeClr val="accent1"/>
+          </a:fillRef>
+          <a:effectRef idx="0">
+            <a:schemeClr val="accent1"/>
+          </a:effectRef>
+          <a:fontRef idx="minor">
+            <a:schemeClr val="lt1"/>
+          </a:fontRef>
+        </p:style>
+        <p:txBody>
+          <a:bodyPr rtlCol="0" anchor="ctr"/>
+          <a:lstStyle/>
+          <a:p>
+            <a:pPr algn="ctr"/>
+            <a:endParaRPr lang="en-US"/>
+          </a:p>
+        </p:txBody>
+      </p:sp>
+      <p:sp>
+        <p:nvSpPr>
+          <p:cNvPr id="12" name="Rectangle 11"/>
+          <p:cNvSpPr/>
+          <p:nvPr/>
+        </p:nvSpPr>
+        <p:spPr>
+          <a:xfrm>
+            <a:off x="9888311" y="5117592"/>
+            <a:ext cx="548640" cy="548640"/>
+          </a:xfrm>
+          <a:prstGeom prst="rect">
+            <a:avLst/>
+          </a:prstGeom>
+          <a:solidFill>
+            <a:srgbClr val="00B0F0"/>
+          </a:solidFill>
+          <a:ln>
+            <a:solidFill>
+              <a:schemeClr val="tx1"/>
+            </a:solidFill>
+          </a:ln>
+        </p:spPr>
+        <p:style>
+          <a:lnRef idx="2">
+            <a:schemeClr val="accent1">
+              <a:shade val="50000"/>
+            </a:schemeClr>
+          </a:lnRef>
+          <a:fillRef idx="1">
+            <a:schemeClr val="accent1"/>
+          </a:fillRef>
+          <a:effectRef idx="0">
+            <a:schemeClr val="accent1"/>
+          </a:effectRef>
+          <a:fontRef idx="minor">
+            <a:schemeClr val="lt1"/>
+          </a:fontRef>
+        </p:style>
+        <p:txBody>
+          <a:bodyPr rtlCol="0" anchor="ctr"/>
+          <a:lstStyle/>
+          <a:p>
+            <a:pPr algn="ctr"/>
+            <a:endParaRPr lang="en-US"/>
+          </a:p>
+        </p:txBody>
+      </p:sp>
+      <p:cxnSp>
+        <p:nvCxnSpPr>
+          <p:cNvPr id="14" name="Straight Arrow Connector 13"/>
+          <p:cNvCxnSpPr>
+            <a:stCxn id="8" idx="2"/>
+            <a:endCxn id="9" idx="7"/>
+          </p:cNvCxnSpPr>
+          <p:nvPr/>
+        </p:nvCxnSpPr>
+        <p:spPr>
+          <a:xfrm flipH="1">
+            <a:off x="8453038" y="3465576"/>
+            <a:ext cx="450170" cy="522388"/>
+          </a:xfrm>
+          <a:prstGeom prst="straightConnector1">
+            <a:avLst/>
+          </a:prstGeom>
+          <a:ln w="28575">
+            <a:solidFill>
+              <a:schemeClr val="tx1"/>
+            </a:solidFill>
+            <a:tailEnd type="stealth" w="lg" len="lg"/>
+          </a:ln>
+        </p:spPr>
+        <p:style>
+          <a:lnRef idx="1">
+            <a:schemeClr val="accent1"/>
+          </a:lnRef>
+          <a:fillRef idx="0">
+            <a:schemeClr val="accent1"/>
+          </a:fillRef>
+          <a:effectRef idx="0">
+            <a:schemeClr val="accent1"/>
+          </a:effectRef>
+          <a:fontRef idx="minor">
+            <a:schemeClr val="tx1"/>
+          </a:fontRef>
+        </p:style>
+      </p:cxnSp>
+      <p:cxnSp>
+        <p:nvCxnSpPr>
+          <p:cNvPr id="17" name="Straight Arrow Connector 16"/>
+          <p:cNvCxnSpPr>
+            <a:stCxn id="8" idx="2"/>
+            <a:endCxn id="10" idx="0"/>
+          </p:cNvCxnSpPr>
+          <p:nvPr/>
+        </p:nvCxnSpPr>
+        <p:spPr>
+          <a:xfrm>
+            <a:off x="8903208" y="3465576"/>
+            <a:ext cx="756403" cy="408473"/>
+          </a:xfrm>
+          <a:prstGeom prst="straightConnector1">
+            <a:avLst/>
+          </a:prstGeom>
+          <a:ln w="28575">
+            <a:solidFill>
+              <a:schemeClr val="tx1"/>
+            </a:solidFill>
+            <a:tailEnd type="stealth" w="lg" len="lg"/>
+          </a:ln>
+        </p:spPr>
+        <p:style>
+          <a:lnRef idx="1">
+            <a:schemeClr val="accent1"/>
+          </a:lnRef>
+          <a:fillRef idx="0">
+            <a:schemeClr val="accent1"/>
+          </a:fillRef>
+          <a:effectRef idx="0">
+            <a:schemeClr val="accent1"/>
+          </a:effectRef>
+          <a:fontRef idx="minor">
+            <a:schemeClr val="tx1"/>
+          </a:fontRef>
+        </p:style>
+      </p:cxnSp>
+      <p:cxnSp>
+        <p:nvCxnSpPr>
+          <p:cNvPr id="20" name="Straight Arrow Connector 19"/>
+          <p:cNvCxnSpPr>
+            <a:stCxn id="10" idx="2"/>
+            <a:endCxn id="11" idx="0"/>
+          </p:cNvCxnSpPr>
+          <p:nvPr/>
+        </p:nvCxnSpPr>
+        <p:spPr>
+          <a:xfrm flipH="1">
+            <a:off x="9165118" y="4422689"/>
+            <a:ext cx="494493" cy="501863"/>
+          </a:xfrm>
+          <a:prstGeom prst="straightConnector1">
+            <a:avLst/>
+          </a:prstGeom>
+          <a:ln w="28575">
+            <a:solidFill>
+              <a:schemeClr val="tx1"/>
+            </a:solidFill>
+            <a:tailEnd type="stealth" w="lg" len="lg"/>
+          </a:ln>
+        </p:spPr>
+        <p:style>
+          <a:lnRef idx="1">
+            <a:schemeClr val="accent1"/>
+          </a:lnRef>
+          <a:fillRef idx="0">
+            <a:schemeClr val="accent1"/>
+          </a:fillRef>
+          <a:effectRef idx="0">
+            <a:schemeClr val="accent1"/>
+          </a:effectRef>
+          <a:fontRef idx="minor">
+            <a:schemeClr val="tx1"/>
+          </a:fontRef>
+        </p:style>
+      </p:cxnSp>
+      <p:cxnSp>
+        <p:nvCxnSpPr>
+          <p:cNvPr id="23" name="Straight Arrow Connector 22"/>
+          <p:cNvCxnSpPr>
+            <a:stCxn id="10" idx="2"/>
+            <a:endCxn id="12" idx="0"/>
+          </p:cNvCxnSpPr>
+          <p:nvPr/>
+        </p:nvCxnSpPr>
+        <p:spPr>
+          <a:xfrm>
+            <a:off x="9659611" y="4422689"/>
+            <a:ext cx="503020" cy="694903"/>
+          </a:xfrm>
+          <a:prstGeom prst="straightConnector1">
+            <a:avLst/>
+          </a:prstGeom>
+          <a:ln w="28575">
+            <a:solidFill>
+              <a:schemeClr val="tx1"/>
+            </a:solidFill>
+            <a:tailEnd type="stealth" w="lg" len="lg"/>
+          </a:ln>
+        </p:spPr>
+        <p:style>
+          <a:lnRef idx="1">
+            <a:schemeClr val="accent1"/>
+          </a:lnRef>
+          <a:fillRef idx="0">
+            <a:schemeClr val="accent1"/>
+          </a:fillRef>
+          <a:effectRef idx="0">
+            <a:schemeClr val="accent1"/>
+          </a:effectRef>
+          <a:fontRef idx="minor">
+            <a:schemeClr val="tx1"/>
+          </a:fontRef>
+        </p:style>
+      </p:cxnSp>
+      <p:sp>
+        <p:nvSpPr>
+          <p:cNvPr id="33" name="Rectangle 32"/>
+          <p:cNvSpPr/>
+          <p:nvPr/>
+        </p:nvSpPr>
+        <p:spPr>
+          <a:xfrm>
+            <a:off x="7843402" y="5001809"/>
+            <a:ext cx="548640" cy="548640"/>
+          </a:xfrm>
+          <a:prstGeom prst="rect">
+            <a:avLst/>
+          </a:prstGeom>
+          <a:solidFill>
+            <a:srgbClr val="00B0F0"/>
+          </a:solidFill>
+          <a:ln>
+            <a:solidFill>
+              <a:schemeClr val="tx1"/>
+            </a:solidFill>
+          </a:ln>
+        </p:spPr>
+        <p:style>
+          <a:lnRef idx="2">
+            <a:schemeClr val="accent1">
+              <a:shade val="50000"/>
+            </a:schemeClr>
+          </a:lnRef>
+          <a:fillRef idx="1">
+            <a:schemeClr val="accent1"/>
+          </a:fillRef>
+          <a:effectRef idx="0">
+            <a:schemeClr val="accent1"/>
+          </a:effectRef>
+          <a:fontRef idx="minor">
+            <a:schemeClr val="lt1"/>
+          </a:fontRef>
+        </p:style>
+        <p:txBody>
+          <a:bodyPr rtlCol="0" anchor="ctr"/>
+          <a:lstStyle/>
+          <a:p>
+            <a:pPr algn="ctr"/>
+            <a:endParaRPr lang="en-US"/>
+          </a:p>
+        </p:txBody>
+      </p:sp>
+      <p:cxnSp>
+        <p:nvCxnSpPr>
+          <p:cNvPr id="34" name="Straight Arrow Connector 33"/>
+          <p:cNvCxnSpPr>
+            <a:stCxn id="9" idx="4"/>
+            <a:endCxn id="33" idx="0"/>
+          </p:cNvCxnSpPr>
+          <p:nvPr/>
+        </p:nvCxnSpPr>
+        <p:spPr>
+          <a:xfrm flipH="1">
+            <a:off x="8117722" y="4456258"/>
+            <a:ext cx="141342" cy="545551"/>
+          </a:xfrm>
+          <a:prstGeom prst="straightConnector1">
+            <a:avLst/>
+          </a:prstGeom>
+          <a:ln w="28575">
+            <a:solidFill>
+              <a:schemeClr val="tx1"/>
+            </a:solidFill>
+            <a:tailEnd type="stealth" w="lg" len="lg"/>
+          </a:ln>
+        </p:spPr>
+        <p:style>
+          <a:lnRef idx="1">
+            <a:schemeClr val="accent1"/>
+          </a:lnRef>
+          <a:fillRef idx="0">
+            <a:schemeClr val="accent1"/>
+          </a:fillRef>
+          <a:effectRef idx="0">
+            <a:schemeClr val="accent1"/>
+          </a:effectRef>
+          <a:fontRef idx="minor">
+            <a:schemeClr val="tx1"/>
+          </a:fontRef>
+        </p:style>
+      </p:cxnSp>
+    </p:spTree>
+    <p:extLst>
+      <p:ext uri="{BB962C8B-B14F-4D97-AF65-F5344CB8AC3E}">
+        <p14:creationId xmlns:p14="http://schemas.microsoft.com/office/powerpoint/2010/main" val="634073160"/>
       </p:ext>
     </p:extLst>
   </p:cSld>

</xml_diff>